<commit_message>
added test set performance
</commit_message>
<xml_diff>
--- a/time_series_regression.pptx
+++ b/time_series_regression.pptx
@@ -6525,7 +6525,16 @@
                 <a:pPr lvl="1"/>
                 <a:r>
                   <a:rPr/>
-                  <a:t>In order to measure the quality of the methods: re-simulate the training data (</a:t>
+                  <a:t>In order to measure the quality of the methods:</a:t>
+                </a:r>
+              </a:p>
+              <a:p>
+                <a:pPr lvl="2">
+                  <a:buAutoNum type="arabicPeriod"/>
+                </a:pPr>
+                <a:r>
+                  <a:rPr/>
+                  <a:t>Re-simulate the training data (</a:t>
                 </a:r>
                 <a14:m>
                   <m:oMath xmlns:m="http://schemas.openxmlformats.org/officeDocument/2006/math">
@@ -6554,9 +6563,14 @@
                     </m:r>
                   </m:oMath>
                 </a14:m>
+              </a:p>
+              <a:p>
+                <a:pPr lvl="2">
+                  <a:buAutoNum type="arabicPeriod"/>
+                </a:pPr>
                 <a:r>
                   <a:rPr/>
-                  <a:t>, then measure how often Type 1 errors occur (</a:t>
+                  <a:t>Measure how often Type 1 errors occur (</a:t>
                 </a:r>
                 <a14:m>
                   <m:oMath xmlns:m="http://schemas.openxmlformats.org/officeDocument/2006/math">
@@ -6576,7 +6590,16 @@
                 </a14:m>
                 <a:r>
                   <a:rPr/>
-                  <a:t>).</a:t>
+                  <a:t>)</a:t>
+                </a:r>
+              </a:p>
+              <a:p>
+                <a:pPr lvl="2">
+                  <a:buAutoNum type="arabicPeriod"/>
+                </a:pPr>
+                <a:r>
+                  <a:rPr/>
+                  <a:t>Measure test set error</a:t>
                 </a:r>
               </a:p>
               <a:p>
@@ -6722,9 +6745,10 @@
                 <a:tableStyleId>{5C22544A-7EE6-4342-B048-85BDC9FD1C3A}</a:tableStyleId>
               </a:tblPr>
               <a:tblGrid>
-                <a:gridCol w="3644900"/>
-                <a:gridCol w="3644900"/>
-                <a:gridCol w="3644900"/>
+                <a:gridCol w="2730500"/>
+                <a:gridCol w="2730500"/>
+                <a:gridCol w="2730500"/>
+                <a:gridCol w="2730500"/>
               </a:tblGrid>
               <a:tr h="0">
                 <a:tc>
@@ -6775,6 +6799,22 @@
                   </a:txBody>
                   <a:tcPr/>
                 </a:tc>
+                <a:tc>
+                  <a:txBody>
+                    <a:bodyPr/>
+                    <a:lstStyle/>
+                    <a:p>
+                      <a:pPr lvl="0" marL="0" indent="0" algn="r">
+                        <a:buNone/>
+                      </a:pPr>
+                      <a:r>
+                        <a:rPr/>
+                        <a:t>Avg_Test_RMSE</a:t>
+                      </a:r>
+                    </a:p>
+                  </a:txBody>
+                  <a:tcPr/>
+                </a:tc>
               </a:tr>
               <a:tr h="0">
                 <a:tc>
@@ -6789,6 +6829,14 @@
                         <a:rPr/>
                         <a:t>1-Low</a:t>
                       </a:r>
+                      <a:r>
+                        <a:rPr/>
+                        <a:t> </a:t>
+                      </a:r>
+                      <a:r>
+                        <a:rPr/>
+                        <a:t>(0.1)</a:t>
+                      </a:r>
                     </a:p>
                   </a:txBody>
                 </a:tc>
@@ -6818,6 +6866,21 @@
                       <a:r>
                         <a:rPr/>
                         <a:t>0.109</a:t>
+                      </a:r>
+                    </a:p>
+                  </a:txBody>
+                </a:tc>
+                <a:tc>
+                  <a:txBody>
+                    <a:bodyPr/>
+                    <a:lstStyle/>
+                    <a:p>
+                      <a:pPr lvl="0" marL="0" indent="0" algn="r">
+                        <a:buNone/>
+                      </a:pPr>
+                      <a:r>
+                        <a:rPr/>
+                        <a:t>5.1</a:t>
                       </a:r>
                     </a:p>
                   </a:txBody>
@@ -6836,6 +6899,14 @@
                         <a:rPr/>
                         <a:t>1-Low</a:t>
                       </a:r>
+                      <a:r>
+                        <a:rPr/>
+                        <a:t> </a:t>
+                      </a:r>
+                      <a:r>
+                        <a:rPr/>
+                        <a:t>(0.1)</a:t>
+                      </a:r>
                     </a:p>
                   </a:txBody>
                 </a:tc>
@@ -6865,6 +6936,21 @@
                       <a:r>
                         <a:rPr/>
                         <a:t>0.114</a:t>
+                      </a:r>
+                    </a:p>
+                  </a:txBody>
+                </a:tc>
+                <a:tc>
+                  <a:txBody>
+                    <a:bodyPr/>
+                    <a:lstStyle/>
+                    <a:p>
+                      <a:pPr lvl="0" marL="0" indent="0" algn="r">
+                        <a:buNone/>
+                      </a:pPr>
+                      <a:r>
+                        <a:rPr/>
+                        <a:t>5.1</a:t>
                       </a:r>
                     </a:p>
                   </a:txBody>
@@ -6883,6 +6969,14 @@
                         <a:rPr/>
                         <a:t>1-Low</a:t>
                       </a:r>
+                      <a:r>
+                        <a:rPr/>
+                        <a:t> </a:t>
+                      </a:r>
+                      <a:r>
+                        <a:rPr/>
+                        <a:t>(0.1)</a:t>
+                      </a:r>
                     </a:p>
                   </a:txBody>
                 </a:tc>
@@ -6912,6 +7006,21 @@
                       <a:r>
                         <a:rPr/>
                         <a:t>0.120</a:t>
+                      </a:r>
+                    </a:p>
+                  </a:txBody>
+                </a:tc>
+                <a:tc>
+                  <a:txBody>
+                    <a:bodyPr/>
+                    <a:lstStyle/>
+                    <a:p>
+                      <a:pPr lvl="0" marL="0" indent="0" algn="r">
+                        <a:buNone/>
+                      </a:pPr>
+                      <a:r>
+                        <a:rPr/>
+                        <a:t>NA</a:t>
                       </a:r>
                     </a:p>
                   </a:txBody>
@@ -6930,6 +7039,14 @@
                         <a:rPr/>
                         <a:t>1-Low</a:t>
                       </a:r>
+                      <a:r>
+                        <a:rPr/>
+                        <a:t> </a:t>
+                      </a:r>
+                      <a:r>
+                        <a:rPr/>
+                        <a:t>(0.1)</a:t>
+                      </a:r>
                     </a:p>
                   </a:txBody>
                 </a:tc>
@@ -6959,6 +7076,21 @@
                       <a:r>
                         <a:rPr/>
                         <a:t>0.128</a:t>
+                      </a:r>
+                    </a:p>
+                  </a:txBody>
+                </a:tc>
+                <a:tc>
+                  <a:txBody>
+                    <a:bodyPr/>
+                    <a:lstStyle/>
+                    <a:p>
+                      <a:pPr lvl="0" marL="0" indent="0" algn="r">
+                        <a:buNone/>
+                      </a:pPr>
+                      <a:r>
+                        <a:rPr/>
+                        <a:t>NA</a:t>
                       </a:r>
                     </a:p>
                   </a:txBody>
@@ -6977,6 +7109,14 @@
                         <a:rPr/>
                         <a:t>1-Low</a:t>
                       </a:r>
+                      <a:r>
+                        <a:rPr/>
+                        <a:t> </a:t>
+                      </a:r>
+                      <a:r>
+                        <a:rPr/>
+                        <a:t>(0.1)</a:t>
+                      </a:r>
                     </a:p>
                   </a:txBody>
                 </a:tc>
@@ -7006,6 +7146,21 @@
                       <a:r>
                         <a:rPr/>
                         <a:t>0.138</a:t>
+                      </a:r>
+                    </a:p>
+                  </a:txBody>
+                </a:tc>
+                <a:tc>
+                  <a:txBody>
+                    <a:bodyPr/>
+                    <a:lstStyle/>
+                    <a:p>
+                      <a:pPr lvl="0" marL="0" indent="0" algn="r">
+                        <a:buNone/>
+                      </a:pPr>
+                      <a:r>
+                        <a:rPr/>
+                        <a:t>NA</a:t>
                       </a:r>
                     </a:p>
                   </a:txBody>
@@ -7036,9 +7191,10 @@
                 <a:tableStyleId>{5C22544A-7EE6-4342-B048-85BDC9FD1C3A}</a:tableStyleId>
               </a:tblPr>
               <a:tblGrid>
-                <a:gridCol w="3657600"/>
-                <a:gridCol w="3657600"/>
-                <a:gridCol w="3657600"/>
+                <a:gridCol w="2743200"/>
+                <a:gridCol w="2743200"/>
+                <a:gridCol w="2743200"/>
+                <a:gridCol w="2743200"/>
               </a:tblGrid>
               <a:tr h="0">
                 <a:tc>
@@ -7089,6 +7245,22 @@
                   </a:txBody>
                   <a:tcPr/>
                 </a:tc>
+                <a:tc>
+                  <a:txBody>
+                    <a:bodyPr/>
+                    <a:lstStyle/>
+                    <a:p>
+                      <a:pPr lvl="0" marL="0" indent="0" algn="r">
+                        <a:buNone/>
+                      </a:pPr>
+                      <a:r>
+                        <a:rPr/>
+                        <a:t>Avg_Test_RMSE</a:t>
+                      </a:r>
+                    </a:p>
+                  </a:txBody>
+                  <a:tcPr/>
+                </a:tc>
               </a:tr>
               <a:tr h="0">
                 <a:tc>
@@ -7101,7 +7273,15 @@
                       </a:pPr>
                       <a:r>
                         <a:rPr/>
-                        <a:t>2-Moderate</a:t>
+                        <a:t>2-High</a:t>
+                      </a:r>
+                      <a:r>
+                        <a:rPr/>
+                        <a:t> </a:t>
+                      </a:r>
+                      <a:r>
+                        <a:rPr/>
+                        <a:t>(0.7)</a:t>
                       </a:r>
                     </a:p>
                   </a:txBody>
@@ -7131,7 +7311,22 @@
                       </a:pPr>
                       <a:r>
                         <a:rPr/>
-                        <a:t>0.099</a:t>
+                        <a:t>0.108</a:t>
+                      </a:r>
+                    </a:p>
+                  </a:txBody>
+                </a:tc>
+                <a:tc>
+                  <a:txBody>
+                    <a:bodyPr/>
+                    <a:lstStyle/>
+                    <a:p>
+                      <a:pPr lvl="0" marL="0" indent="0" algn="r">
+                        <a:buNone/>
+                      </a:pPr>
+                      <a:r>
+                        <a:rPr/>
+                        <a:t>7.0</a:t>
                       </a:r>
                     </a:p>
                   </a:txBody>
@@ -7148,7 +7343,15 @@
                       </a:pPr>
                       <a:r>
                         <a:rPr/>
-                        <a:t>2-Moderate</a:t>
+                        <a:t>2-High</a:t>
+                      </a:r>
+                      <a:r>
+                        <a:rPr/>
+                        <a:t> </a:t>
+                      </a:r>
+                      <a:r>
+                        <a:rPr/>
+                        <a:t>(0.7)</a:t>
                       </a:r>
                     </a:p>
                   </a:txBody>
@@ -7178,7 +7381,22 @@
                       </a:pPr>
                       <a:r>
                         <a:rPr/>
-                        <a:t>0.124</a:t>
+                        <a:t>0.132</a:t>
+                      </a:r>
+                    </a:p>
+                  </a:txBody>
+                </a:tc>
+                <a:tc>
+                  <a:txBody>
+                    <a:bodyPr/>
+                    <a:lstStyle/>
+                    <a:p>
+                      <a:pPr lvl="0" marL="0" indent="0" algn="r">
+                        <a:buNone/>
+                      </a:pPr>
+                      <a:r>
+                        <a:rPr/>
+                        <a:t>NA</a:t>
                       </a:r>
                     </a:p>
                   </a:txBody>
@@ -7195,7 +7413,15 @@
                       </a:pPr>
                       <a:r>
                         <a:rPr/>
-                        <a:t>2-Moderate</a:t>
+                        <a:t>2-High</a:t>
+                      </a:r>
+                      <a:r>
+                        <a:rPr/>
+                        <a:t> </a:t>
+                      </a:r>
+                      <a:r>
+                        <a:rPr/>
+                        <a:t>(0.7)</a:t>
                       </a:r>
                     </a:p>
                   </a:txBody>
@@ -7225,7 +7451,22 @@
                       </a:pPr>
                       <a:r>
                         <a:rPr/>
-                        <a:t>0.134</a:t>
+                        <a:t>0.148</a:t>
+                      </a:r>
+                    </a:p>
+                  </a:txBody>
+                </a:tc>
+                <a:tc>
+                  <a:txBody>
+                    <a:bodyPr/>
+                    <a:lstStyle/>
+                    <a:p>
+                      <a:pPr lvl="0" marL="0" indent="0" algn="r">
+                        <a:buNone/>
+                      </a:pPr>
+                      <a:r>
+                        <a:rPr/>
+                        <a:t>NA</a:t>
                       </a:r>
                     </a:p>
                   </a:txBody>
@@ -7242,7 +7483,15 @@
                       </a:pPr>
                       <a:r>
                         <a:rPr/>
-                        <a:t>2-Moderate</a:t>
+                        <a:t>2-High</a:t>
+                      </a:r>
+                      <a:r>
+                        <a:rPr/>
+                        <a:t> </a:t>
+                      </a:r>
+                      <a:r>
+                        <a:rPr/>
+                        <a:t>(0.7)</a:t>
                       </a:r>
                     </a:p>
                   </a:txBody>
@@ -7272,7 +7521,22 @@
                       </a:pPr>
                       <a:r>
                         <a:rPr/>
-                        <a:t>0.158</a:t>
+                        <a:t>0.174</a:t>
+                      </a:r>
+                    </a:p>
+                  </a:txBody>
+                </a:tc>
+                <a:tc>
+                  <a:txBody>
+                    <a:bodyPr/>
+                    <a:lstStyle/>
+                    <a:p>
+                      <a:pPr lvl="0" marL="0" indent="0" algn="r">
+                        <a:buNone/>
+                      </a:pPr>
+                      <a:r>
+                        <a:rPr/>
+                        <a:t>NA</a:t>
                       </a:r>
                     </a:p>
                   </a:txBody>
@@ -7289,7 +7553,15 @@
                       </a:pPr>
                       <a:r>
                         <a:rPr/>
-                        <a:t>2-Moderate</a:t>
+                        <a:t>2-High</a:t>
+                      </a:r>
+                      <a:r>
+                        <a:rPr/>
+                        <a:t> </a:t>
+                      </a:r>
+                      <a:r>
+                        <a:rPr/>
+                        <a:t>(0.7)</a:t>
                       </a:r>
                     </a:p>
                   </a:txBody>
@@ -7319,7 +7591,22 @@
                       </a:pPr>
                       <a:r>
                         <a:rPr/>
-                        <a:t>0.242</a:t>
+                        <a:t>0.319</a:t>
+                      </a:r>
+                    </a:p>
+                  </a:txBody>
+                </a:tc>
+                <a:tc>
+                  <a:txBody>
+                    <a:bodyPr/>
+                    <a:lstStyle/>
+                    <a:p>
+                      <a:pPr lvl="0" marL="0" indent="0" algn="r">
+                        <a:buNone/>
+                      </a:pPr>
+                      <a:r>
+                        <a:rPr/>
+                        <a:t>7.1</a:t>
                       </a:r>
                     </a:p>
                   </a:txBody>
@@ -7498,6 +7785,14 @@
             </a:pPr>
             <a:r>
               <a:rPr/>
+              <a:t>Very</a:t>
+            </a:r>
+            <a:r>
+              <a:rPr/>
+              <a:t> </a:t>
+            </a:r>
+            <a:r>
+              <a:rPr/>
               <a:t>High</a:t>
             </a:r>
             <a:r>
@@ -7539,7 +7834,7 @@
                 <a:pPr lvl="1"/>
                 <a:r>
                   <a:rPr/>
-                  <a:t>Under high serial correlation, most of the previous methods struggle to return the correct p-values.</a:t>
+                  <a:t>Under very high serial correlation, most of the previous methods struggle to return the correct p-values.</a:t>
                 </a:r>
               </a:p>
               <a:p>
@@ -7592,9 +7887,10 @@
                 <a:tableStyleId>{5C22544A-7EE6-4342-B048-85BDC9FD1C3A}</a:tableStyleId>
               </a:tblPr>
               <a:tblGrid>
-                <a:gridCol w="3657600"/>
-                <a:gridCol w="3657600"/>
-                <a:gridCol w="3657600"/>
+                <a:gridCol w="2743200"/>
+                <a:gridCol w="2743200"/>
+                <a:gridCol w="2743200"/>
+                <a:gridCol w="2743200"/>
               </a:tblGrid>
               <a:tr h="0">
                 <a:tc>
@@ -7645,6 +7941,22 @@
                   </a:txBody>
                   <a:tcPr/>
                 </a:tc>
+                <a:tc>
+                  <a:txBody>
+                    <a:bodyPr/>
+                    <a:lstStyle/>
+                    <a:p>
+                      <a:pPr lvl="0" marL="0" indent="0" algn="r">
+                        <a:buNone/>
+                      </a:pPr>
+                      <a:r>
+                        <a:rPr/>
+                        <a:t>Avg_Test_RMSE</a:t>
+                      </a:r>
+                    </a:p>
+                  </a:txBody>
+                  <a:tcPr/>
+                </a:tc>
               </a:tr>
               <a:tr h="0">
                 <a:tc>
@@ -7657,7 +7969,23 @@
                       </a:pPr>
                       <a:r>
                         <a:rPr/>
-                        <a:t>3-High</a:t>
+                        <a:t>3-Very</a:t>
+                      </a:r>
+                      <a:r>
+                        <a:rPr/>
+                        <a:t> </a:t>
+                      </a:r>
+                      <a:r>
+                        <a:rPr/>
+                        <a:t>High</a:t>
+                      </a:r>
+                      <a:r>
+                        <a:rPr/>
+                        <a:t> </a:t>
+                      </a:r>
+                      <a:r>
+                        <a:rPr/>
+                        <a:t>(0.99)</a:t>
                       </a:r>
                     </a:p>
                   </a:txBody>
@@ -7688,6 +8016,21 @@
                       <a:r>
                         <a:rPr/>
                         <a:t>0.104</a:t>
+                      </a:r>
+                    </a:p>
+                  </a:txBody>
+                </a:tc>
+                <a:tc>
+                  <a:txBody>
+                    <a:bodyPr/>
+                    <a:lstStyle/>
+                    <a:p>
+                      <a:pPr lvl="0" marL="0" indent="0" algn="r">
+                        <a:buNone/>
+                      </a:pPr>
+                      <a:r>
+                        <a:rPr/>
+                        <a:t>26.3</a:t>
                       </a:r>
                     </a:p>
                   </a:txBody>
@@ -7704,7 +8047,23 @@
                       </a:pPr>
                       <a:r>
                         <a:rPr/>
-                        <a:t>3-High</a:t>
+                        <a:t>3-Very</a:t>
+                      </a:r>
+                      <a:r>
+                        <a:rPr/>
+                        <a:t> </a:t>
+                      </a:r>
+                      <a:r>
+                        <a:rPr/>
+                        <a:t>High</a:t>
+                      </a:r>
+                      <a:r>
+                        <a:rPr/>
+                        <a:t> </a:t>
+                      </a:r>
+                      <a:r>
+                        <a:rPr/>
+                        <a:t>(0.99)</a:t>
                       </a:r>
                     </a:p>
                   </a:txBody>
@@ -7735,6 +8094,21 @@
                       <a:r>
                         <a:rPr/>
                         <a:t>0.339</a:t>
+                      </a:r>
+                    </a:p>
+                  </a:txBody>
+                </a:tc>
+                <a:tc>
+                  <a:txBody>
+                    <a:bodyPr/>
+                    <a:lstStyle/>
+                    <a:p>
+                      <a:pPr lvl="0" marL="0" indent="0" algn="r">
+                        <a:buNone/>
+                      </a:pPr>
+                      <a:r>
+                        <a:rPr/>
+                        <a:t>NA</a:t>
                       </a:r>
                     </a:p>
                   </a:txBody>
@@ -7751,7 +8125,23 @@
                       </a:pPr>
                       <a:r>
                         <a:rPr/>
-                        <a:t>3-High</a:t>
+                        <a:t>3-Very</a:t>
+                      </a:r>
+                      <a:r>
+                        <a:rPr/>
+                        <a:t> </a:t>
+                      </a:r>
+                      <a:r>
+                        <a:rPr/>
+                        <a:t>High</a:t>
+                      </a:r>
+                      <a:r>
+                        <a:rPr/>
+                        <a:t> </a:t>
+                      </a:r>
+                      <a:r>
+                        <a:rPr/>
+                        <a:t>(0.99)</a:t>
                       </a:r>
                     </a:p>
                   </a:txBody>
@@ -7782,6 +8172,21 @@
                       <a:r>
                         <a:rPr/>
                         <a:t>0.345</a:t>
+                      </a:r>
+                    </a:p>
+                  </a:txBody>
+                </a:tc>
+                <a:tc>
+                  <a:txBody>
+                    <a:bodyPr/>
+                    <a:lstStyle/>
+                    <a:p>
+                      <a:pPr lvl="0" marL="0" indent="0" algn="r">
+                        <a:buNone/>
+                      </a:pPr>
+                      <a:r>
+                        <a:rPr/>
+                        <a:t>NA</a:t>
                       </a:r>
                     </a:p>
                   </a:txBody>
@@ -7798,7 +8203,23 @@
                       </a:pPr>
                       <a:r>
                         <a:rPr/>
-                        <a:t>3-High</a:t>
+                        <a:t>3-Very</a:t>
+                      </a:r>
+                      <a:r>
+                        <a:rPr/>
+                        <a:t> </a:t>
+                      </a:r>
+                      <a:r>
+                        <a:rPr/>
+                        <a:t>High</a:t>
+                      </a:r>
+                      <a:r>
+                        <a:rPr/>
+                        <a:t> </a:t>
+                      </a:r>
+                      <a:r>
+                        <a:rPr/>
+                        <a:t>(0.99)</a:t>
                       </a:r>
                     </a:p>
                   </a:txBody>
@@ -7829,6 +8250,21 @@
                       <a:r>
                         <a:rPr/>
                         <a:t>0.392</a:t>
+                      </a:r>
+                    </a:p>
+                  </a:txBody>
+                </a:tc>
+                <a:tc>
+                  <a:txBody>
+                    <a:bodyPr/>
+                    <a:lstStyle/>
+                    <a:p>
+                      <a:pPr lvl="0" marL="0" indent="0" algn="r">
+                        <a:buNone/>
+                      </a:pPr>
+                      <a:r>
+                        <a:rPr/>
+                        <a:t>NA</a:t>
                       </a:r>
                     </a:p>
                   </a:txBody>
@@ -7845,7 +8281,23 @@
                       </a:pPr>
                       <a:r>
                         <a:rPr/>
-                        <a:t>3-High</a:t>
+                        <a:t>3-Very</a:t>
+                      </a:r>
+                      <a:r>
+                        <a:rPr/>
+                        <a:t> </a:t>
+                      </a:r>
+                      <a:r>
+                        <a:rPr/>
+                        <a:t>High</a:t>
+                      </a:r>
+                      <a:r>
+                        <a:rPr/>
+                        <a:t> </a:t>
+                      </a:r>
+                      <a:r>
+                        <a:rPr/>
+                        <a:t>(0.99)</a:t>
                       </a:r>
                     </a:p>
                   </a:txBody>
@@ -7876,6 +8328,21 @@
                       <a:r>
                         <a:rPr/>
                         <a:t>0.768</a:t>
+                      </a:r>
+                    </a:p>
+                  </a:txBody>
+                </a:tc>
+                <a:tc>
+                  <a:txBody>
+                    <a:bodyPr/>
+                    <a:lstStyle/>
+                    <a:p>
+                      <a:pPr lvl="0" marL="0" indent="0" algn="r">
+                        <a:buNone/>
+                      </a:pPr>
+                      <a:r>
+                        <a:rPr/>
+                        <a:t>29.3</a:t>
                       </a:r>
                     </a:p>
                   </a:txBody>
@@ -8495,6 +8962,13 @@
             <a:pPr lvl="1"/>
             <a:r>
               <a:rPr/>
+              <a:t>Fortunately, OLS coefficient estimates remain unbiased and consistent</a:t>
+            </a:r>
+          </a:p>
+          <a:p>
+            <a:pPr lvl="1"/>
+            <a:r>
+              <a:rPr/>
               <a:t>Remediating serial correlation:</a:t>
             </a:r>
           </a:p>
@@ -8523,7 +8997,7 @@
             <a:pPr lvl="1"/>
             <a:r>
               <a:rPr/>
-              <a:t>Fortunately, OLS coefficient estimates remain unbiased and consistent</a:t>
+              <a:t>Under non-stationary errors, beware of spurious regressions</a:t>
             </a:r>
           </a:p>
         </p:txBody>

</xml_diff>

<commit_message>
add simulation results for non-stationarity.
</commit_message>
<xml_diff>
--- a/time_series_regression.pptx
+++ b/time_series_regression.pptx
@@ -35,6 +35,7 @@
     <p:sldId id="283" r:id="rId29"/>
     <p:sldId id="284" r:id="rId30"/>
     <p:sldId id="285" r:id="rId31"/>
+    <p:sldId id="286" r:id="rId32"/>
   </p:sldIdLst>
   <p:sldSz cx="12192000" cy="6858000"/>
   <p:notesSz cx="6858000" cy="9144000"/>
@@ -7792,6 +7793,615 @@
             </a:pPr>
             <a:r>
               <a:rPr/>
+              <a:t>Very</a:t>
+            </a:r>
+            <a:r>
+              <a:rPr/>
+              <a:t> </a:t>
+            </a:r>
+            <a:r>
+              <a:rPr/>
+              <a:t>High</a:t>
+            </a:r>
+            <a:r>
+              <a:rPr/>
+              <a:t> </a:t>
+            </a:r>
+            <a:r>
+              <a:rPr/>
+              <a:t>Serial</a:t>
+            </a:r>
+            <a:r>
+              <a:rPr/>
+              <a:t> </a:t>
+            </a:r>
+            <a:r>
+              <a:rPr/>
+              <a:t>Correlation</a:t>
+            </a:r>
+          </a:p>
+        </p:txBody>
+      </p:sp>
+      <mc:AlternateContent xmlns:mc="http://schemas.openxmlformats.org/markup-compatibility/2006">
+        <mc:Choice xmlns:a14="http://schemas.microsoft.com/office/drawing/2010/main" Requires="a14">
+          <p:sp>
+            <p:nvSpPr>
+              <p:cNvPr id="3" name="Content Placeholder 2"/>
+              <p:cNvSpPr>
+                <a:spLocks noGrp="1"/>
+              </p:cNvSpPr>
+              <p:nvPr>
+                <p:ph idx="1" sz="half"/>
+              </p:nvPr>
+            </p:nvSpPr>
+            <p:spPr/>
+            <p:txBody>
+              <a:bodyPr/>
+              <a:lstStyle/>
+              <a:p>
+                <a:pPr lvl="1"/>
+                <a:r>
+                  <a:rPr/>
+                  <a:t>Under very high serial correlation, most of the previous methods struggle to return the correct p-values.</a:t>
+                </a:r>
+              </a:p>
+              <a:p>
+                <a:pPr lvl="1"/>
+                <a:r>
+                  <a:rPr/>
+                  <a:t>If </a:t>
+                </a:r>
+                <a14:m>
+                  <m:oMath xmlns:m="http://schemas.openxmlformats.org/officeDocument/2006/math">
+                    <m:acc>
+                      <m:accPr>
+                        <m:chr m:val="̂"/>
+                      </m:accPr>
+                      <m:e>
+                        <m:r>
+                          <m:t>ρ</m:t>
+                        </m:r>
+                      </m:e>
+                    </m:acc>
+                  </m:oMath>
+                </a14:m>
+                <a:r>
+                  <a:rPr/>
+                  <a:t> is close to -1 or 1, then check for non-stationary errors (e.g., Phillips-Ouliaris Cointegration Test; Pesaran-Shin-Smith Cointegration Test).</a:t>
+                </a:r>
+              </a:p>
+            </p:txBody>
+          </p:sp>
+        </mc:Choice>
+      </mc:AlternateContent>
+      <p:graphicFrame>
+        <p:nvGraphicFramePr>
+          <p:cNvPr id="6" name="Content Placeholder 5"/>
+          <p:cNvGraphicFramePr>
+            <a:graphicFrameLocks noGrp="1"/>
+          </p:cNvGraphicFramePr>
+          <p:nvPr>
+            <p:ph idx="1"/>
+          </p:nvPr>
+        </p:nvGraphicFramePr>
+        <p:xfrm>
+          <a:off x="609600" y="3975100"/>
+          <a:ext cx="10972800" cy="2146300"/>
+        </p:xfrm>
+        <a:graphic>
+          <a:graphicData uri="http://schemas.openxmlformats.org/drawingml/2006/table">
+            <a:tbl>
+              <a:tblPr firstRow="1" bandRow="1">
+                <a:tableStyleId>{5C22544A-7EE6-4342-B048-85BDC9FD1C3A}</a:tableStyleId>
+              </a:tblPr>
+              <a:tblGrid>
+                <a:gridCol w="2743200"/>
+                <a:gridCol w="2743200"/>
+                <a:gridCol w="2743200"/>
+                <a:gridCol w="2743200"/>
+              </a:tblGrid>
+              <a:tr h="0">
+                <a:tc>
+                  <a:txBody>
+                    <a:bodyPr/>
+                    <a:lstStyle/>
+                    <a:p>
+                      <a:pPr lvl="0" marL="0" indent="0" algn="l">
+                        <a:buNone/>
+                      </a:pPr>
+                      <a:r>
+                        <a:rPr/>
+                        <a:t>rho</a:t>
+                      </a:r>
+                    </a:p>
+                  </a:txBody>
+                  <a:tcPr/>
+                </a:tc>
+                <a:tc>
+                  <a:txBody>
+                    <a:bodyPr/>
+                    <a:lstStyle/>
+                    <a:p>
+                      <a:pPr lvl="0" marL="0" indent="0" algn="l">
+                        <a:buNone/>
+                      </a:pPr>
+                      <a:r>
+                        <a:rPr/>
+                        <a:t>method</a:t>
+                      </a:r>
+                    </a:p>
+                  </a:txBody>
+                  <a:tcPr/>
+                </a:tc>
+                <a:tc>
+                  <a:txBody>
+                    <a:bodyPr/>
+                    <a:lstStyle/>
+                    <a:p>
+                      <a:pPr lvl="0" marL="0" indent="0" algn="r">
+                        <a:buNone/>
+                      </a:pPr>
+                      <a:r>
+                        <a:rPr/>
+                        <a:t>Prob_Type_1_Error</a:t>
+                      </a:r>
+                    </a:p>
+                  </a:txBody>
+                  <a:tcPr/>
+                </a:tc>
+                <a:tc>
+                  <a:txBody>
+                    <a:bodyPr/>
+                    <a:lstStyle/>
+                    <a:p>
+                      <a:pPr lvl="0" marL="0" indent="0" algn="r">
+                        <a:buNone/>
+                      </a:pPr>
+                      <a:r>
+                        <a:rPr/>
+                        <a:t>Avg_Test_RMSE</a:t>
+                      </a:r>
+                    </a:p>
+                  </a:txBody>
+                  <a:tcPr/>
+                </a:tc>
+              </a:tr>
+              <a:tr h="0">
+                <a:tc>
+                  <a:txBody>
+                    <a:bodyPr/>
+                    <a:lstStyle/>
+                    <a:p>
+                      <a:pPr lvl="0" marL="0" indent="0" algn="l">
+                        <a:buNone/>
+                      </a:pPr>
+                      <a:r>
+                        <a:rPr/>
+                        <a:t>3-Very</a:t>
+                      </a:r>
+                      <a:r>
+                        <a:rPr/>
+                        <a:t> </a:t>
+                      </a:r>
+                      <a:r>
+                        <a:rPr/>
+                        <a:t>High</a:t>
+                      </a:r>
+                      <a:r>
+                        <a:rPr/>
+                        <a:t> </a:t>
+                      </a:r>
+                      <a:r>
+                        <a:rPr/>
+                        <a:t>(0.9)</a:t>
+                      </a:r>
+                    </a:p>
+                  </a:txBody>
+                </a:tc>
+                <a:tc>
+                  <a:txBody>
+                    <a:bodyPr/>
+                    <a:lstStyle/>
+                    <a:p>
+                      <a:pPr lvl="0" marL="0" indent="0" algn="l">
+                        <a:buNone/>
+                      </a:pPr>
+                      <a:r>
+                        <a:rPr/>
+                        <a:t>gls</a:t>
+                      </a:r>
+                    </a:p>
+                  </a:txBody>
+                </a:tc>
+                <a:tc>
+                  <a:txBody>
+                    <a:bodyPr/>
+                    <a:lstStyle/>
+                    <a:p>
+                      <a:pPr lvl="0" marL="0" indent="0" algn="r">
+                        <a:buNone/>
+                      </a:pPr>
+                      <a:r>
+                        <a:rPr/>
+                        <a:t>0.096</a:t>
+                      </a:r>
+                    </a:p>
+                  </a:txBody>
+                </a:tc>
+                <a:tc>
+                  <a:txBody>
+                    <a:bodyPr/>
+                    <a:lstStyle/>
+                    <a:p>
+                      <a:pPr lvl="0" marL="0" indent="0" algn="r">
+                        <a:buNone/>
+                      </a:pPr>
+                      <a:r>
+                        <a:rPr/>
+                        <a:t>12.0</a:t>
+                      </a:r>
+                    </a:p>
+                  </a:txBody>
+                </a:tc>
+              </a:tr>
+              <a:tr h="0">
+                <a:tc>
+                  <a:txBody>
+                    <a:bodyPr/>
+                    <a:lstStyle/>
+                    <a:p>
+                      <a:pPr lvl="0" marL="0" indent="0" algn="l">
+                        <a:buNone/>
+                      </a:pPr>
+                      <a:r>
+                        <a:rPr/>
+                        <a:t>3-Very</a:t>
+                      </a:r>
+                      <a:r>
+                        <a:rPr/>
+                        <a:t> </a:t>
+                      </a:r>
+                      <a:r>
+                        <a:rPr/>
+                        <a:t>High</a:t>
+                      </a:r>
+                      <a:r>
+                        <a:rPr/>
+                        <a:t> </a:t>
+                      </a:r>
+                      <a:r>
+                        <a:rPr/>
+                        <a:t>(0.9)</a:t>
+                      </a:r>
+                    </a:p>
+                  </a:txBody>
+                </a:tc>
+                <a:tc>
+                  <a:txBody>
+                    <a:bodyPr/>
+                    <a:lstStyle/>
+                    <a:p>
+                      <a:pPr lvl="0" marL="0" indent="0" algn="l">
+                        <a:buNone/>
+                      </a:pPr>
+                      <a:r>
+                        <a:rPr/>
+                        <a:t>andrews</a:t>
+                      </a:r>
+                    </a:p>
+                  </a:txBody>
+                </a:tc>
+                <a:tc>
+                  <a:txBody>
+                    <a:bodyPr/>
+                    <a:lstStyle/>
+                    <a:p>
+                      <a:pPr lvl="0" marL="0" indent="0" algn="r">
+                        <a:buNone/>
+                      </a:pPr>
+                      <a:r>
+                        <a:rPr/>
+                        <a:t>0.186</a:t>
+                      </a:r>
+                    </a:p>
+                  </a:txBody>
+                </a:tc>
+                <a:tc>
+                  <a:txBody>
+                    <a:bodyPr/>
+                    <a:lstStyle/>
+                    <a:p>
+                      <a:pPr lvl="0" marL="0" indent="0" algn="r">
+                        <a:buNone/>
+                      </a:pPr>
+                      <a:r>
+                        <a:rPr/>
+                        <a:t>NA</a:t>
+                      </a:r>
+                    </a:p>
+                  </a:txBody>
+                </a:tc>
+              </a:tr>
+              <a:tr h="0">
+                <a:tc>
+                  <a:txBody>
+                    <a:bodyPr/>
+                    <a:lstStyle/>
+                    <a:p>
+                      <a:pPr lvl="0" marL="0" indent="0" algn="l">
+                        <a:buNone/>
+                      </a:pPr>
+                      <a:r>
+                        <a:rPr/>
+                        <a:t>3-Very</a:t>
+                      </a:r>
+                      <a:r>
+                        <a:rPr/>
+                        <a:t> </a:t>
+                      </a:r>
+                      <a:r>
+                        <a:rPr/>
+                        <a:t>High</a:t>
+                      </a:r>
+                      <a:r>
+                        <a:rPr/>
+                        <a:t> </a:t>
+                      </a:r>
+                      <a:r>
+                        <a:rPr/>
+                        <a:t>(0.9)</a:t>
+                      </a:r>
+                    </a:p>
+                  </a:txBody>
+                </a:tc>
+                <a:tc>
+                  <a:txBody>
+                    <a:bodyPr/>
+                    <a:lstStyle/>
+                    <a:p>
+                      <a:pPr lvl="0" marL="0" indent="0" algn="l">
+                        <a:buNone/>
+                      </a:pPr>
+                      <a:r>
+                        <a:rPr/>
+                        <a:t>nw</a:t>
+                      </a:r>
+                    </a:p>
+                  </a:txBody>
+                </a:tc>
+                <a:tc>
+                  <a:txBody>
+                    <a:bodyPr/>
+                    <a:lstStyle/>
+                    <a:p>
+                      <a:pPr lvl="0" marL="0" indent="0" algn="r">
+                        <a:buNone/>
+                      </a:pPr>
+                      <a:r>
+                        <a:rPr/>
+                        <a:t>0.195</a:t>
+                      </a:r>
+                    </a:p>
+                  </a:txBody>
+                </a:tc>
+                <a:tc>
+                  <a:txBody>
+                    <a:bodyPr/>
+                    <a:lstStyle/>
+                    <a:p>
+                      <a:pPr lvl="0" marL="0" indent="0" algn="r">
+                        <a:buNone/>
+                      </a:pPr>
+                      <a:r>
+                        <a:rPr/>
+                        <a:t>NA</a:t>
+                      </a:r>
+                    </a:p>
+                  </a:txBody>
+                </a:tc>
+              </a:tr>
+              <a:tr h="0">
+                <a:tc>
+                  <a:txBody>
+                    <a:bodyPr/>
+                    <a:lstStyle/>
+                    <a:p>
+                      <a:pPr lvl="0" marL="0" indent="0" algn="l">
+                        <a:buNone/>
+                      </a:pPr>
+                      <a:r>
+                        <a:rPr/>
+                        <a:t>3-Very</a:t>
+                      </a:r>
+                      <a:r>
+                        <a:rPr/>
+                        <a:t> </a:t>
+                      </a:r>
+                      <a:r>
+                        <a:rPr/>
+                        <a:t>High</a:t>
+                      </a:r>
+                      <a:r>
+                        <a:rPr/>
+                        <a:t> </a:t>
+                      </a:r>
+                      <a:r>
+                        <a:rPr/>
+                        <a:t>(0.9)</a:t>
+                      </a:r>
+                    </a:p>
+                  </a:txBody>
+                </a:tc>
+                <a:tc>
+                  <a:txBody>
+                    <a:bodyPr/>
+                    <a:lstStyle/>
+                    <a:p>
+                      <a:pPr lvl="0" marL="0" indent="0" algn="l">
+                        <a:buNone/>
+                      </a:pPr>
+                      <a:r>
+                        <a:rPr/>
+                        <a:t>bootstrap</a:t>
+                      </a:r>
+                    </a:p>
+                  </a:txBody>
+                </a:tc>
+                <a:tc>
+                  <a:txBody>
+                    <a:bodyPr/>
+                    <a:lstStyle/>
+                    <a:p>
+                      <a:pPr lvl="0" marL="0" indent="0" algn="r">
+                        <a:buNone/>
+                      </a:pPr>
+                      <a:r>
+                        <a:rPr/>
+                        <a:t>0.233</a:t>
+                      </a:r>
+                    </a:p>
+                  </a:txBody>
+                </a:tc>
+                <a:tc>
+                  <a:txBody>
+                    <a:bodyPr/>
+                    <a:lstStyle/>
+                    <a:p>
+                      <a:pPr lvl="0" marL="0" indent="0" algn="r">
+                        <a:buNone/>
+                      </a:pPr>
+                      <a:r>
+                        <a:rPr/>
+                        <a:t>NA</a:t>
+                      </a:r>
+                    </a:p>
+                  </a:txBody>
+                </a:tc>
+              </a:tr>
+              <a:tr h="0">
+                <a:tc>
+                  <a:txBody>
+                    <a:bodyPr/>
+                    <a:lstStyle/>
+                    <a:p>
+                      <a:pPr lvl="0" marL="0" indent="0" algn="l">
+                        <a:buNone/>
+                      </a:pPr>
+                      <a:r>
+                        <a:rPr/>
+                        <a:t>3-Very</a:t>
+                      </a:r>
+                      <a:r>
+                        <a:rPr/>
+                        <a:t> </a:t>
+                      </a:r>
+                      <a:r>
+                        <a:rPr/>
+                        <a:t>High</a:t>
+                      </a:r>
+                      <a:r>
+                        <a:rPr/>
+                        <a:t> </a:t>
+                      </a:r>
+                      <a:r>
+                        <a:rPr/>
+                        <a:t>(0.9)</a:t>
+                      </a:r>
+                    </a:p>
+                  </a:txBody>
+                </a:tc>
+                <a:tc>
+                  <a:txBody>
+                    <a:bodyPr/>
+                    <a:lstStyle/>
+                    <a:p>
+                      <a:pPr lvl="0" marL="0" indent="0" algn="l">
+                        <a:buNone/>
+                      </a:pPr>
+                      <a:r>
+                        <a:rPr/>
+                        <a:t>lm</a:t>
+                      </a:r>
+                    </a:p>
+                  </a:txBody>
+                </a:tc>
+                <a:tc>
+                  <a:txBody>
+                    <a:bodyPr/>
+                    <a:lstStyle/>
+                    <a:p>
+                      <a:pPr lvl="0" marL="0" indent="0" algn="r">
+                        <a:buNone/>
+                      </a:pPr>
+                      <a:r>
+                        <a:rPr/>
+                        <a:t>0.550</a:t>
+                      </a:r>
+                    </a:p>
+                  </a:txBody>
+                </a:tc>
+                <a:tc>
+                  <a:txBody>
+                    <a:bodyPr/>
+                    <a:lstStyle/>
+                    <a:p>
+                      <a:pPr lvl="0" marL="0" indent="0" algn="r">
+                        <a:buNone/>
+                      </a:pPr>
+                      <a:r>
+                        <a:rPr/>
+                        <a:t>12.7</a:t>
+                      </a:r>
+                    </a:p>
+                  </a:txBody>
+                </a:tc>
+              </a:tr>
+            </a:tbl>
+          </a:graphicData>
+        </a:graphic>
+      </p:graphicFrame>
+    </p:spTree>
+  </p:cSld>
+</p:sld>
+</file>
+
+<file path=ppt/slides/slide21.xml><?xml version="1.0" encoding="utf-8"?>
+<p:sld xmlns:a="http://schemas.openxmlformats.org/drawingml/2006/main" xmlns:r="http://schemas.openxmlformats.org/officeDocument/2006/relationships" xmlns:p="http://schemas.openxmlformats.org/presentationml/2006/main">
+  <p:cSld>
+    <p:spTree>
+      <p:nvGrpSpPr>
+        <p:cNvPr id="1" name=""/>
+        <p:cNvGrpSpPr/>
+        <p:nvPr/>
+      </p:nvGrpSpPr>
+      <p:grpSpPr>
+        <a:xfrm>
+          <a:off x="0" y="0"/>
+          <a:ext cx="0" cy="0"/>
+          <a:chOff x="0" y="0"/>
+          <a:chExt cx="0" cy="0"/>
+        </a:xfrm>
+      </p:grpSpPr>
+      <p:sp>
+        <p:nvSpPr>
+          <p:cNvPr id="2" name="Title 1"/>
+          <p:cNvSpPr>
+            <a:spLocks noGrp="1"/>
+          </p:cNvSpPr>
+          <p:nvPr>
+            <p:ph type="title"/>
+          </p:nvPr>
+        </p:nvSpPr>
+        <p:spPr/>
+        <p:txBody>
+          <a:bodyPr/>
+          <a:lstStyle/>
+          <a:p>
+            <a:pPr lvl="0" marL="0" indent="0">
+              <a:buNone/>
+            </a:pPr>
+            <a:r>
+              <a:rPr/>
               <a:t>Test</a:t>
             </a:r>
             <a:r>
@@ -7991,615 +8601,6 @@
           </p:sp>
         </mc:Choice>
       </mc:AlternateContent>
-    </p:spTree>
-  </p:cSld>
-</p:sld>
-</file>
-
-<file path=ppt/slides/slide21.xml><?xml version="1.0" encoding="utf-8"?>
-<p:sld xmlns:a="http://schemas.openxmlformats.org/drawingml/2006/main" xmlns:r="http://schemas.openxmlformats.org/officeDocument/2006/relationships" xmlns:p="http://schemas.openxmlformats.org/presentationml/2006/main">
-  <p:cSld>
-    <p:spTree>
-      <p:nvGrpSpPr>
-        <p:cNvPr id="1" name=""/>
-        <p:cNvGrpSpPr/>
-        <p:nvPr/>
-      </p:nvGrpSpPr>
-      <p:grpSpPr>
-        <a:xfrm>
-          <a:off x="0" y="0"/>
-          <a:ext cx="0" cy="0"/>
-          <a:chOff x="0" y="0"/>
-          <a:chExt cx="0" cy="0"/>
-        </a:xfrm>
-      </p:grpSpPr>
-      <p:sp>
-        <p:nvSpPr>
-          <p:cNvPr id="2" name="Title 1"/>
-          <p:cNvSpPr>
-            <a:spLocks noGrp="1"/>
-          </p:cNvSpPr>
-          <p:nvPr>
-            <p:ph type="title"/>
-          </p:nvPr>
-        </p:nvSpPr>
-        <p:spPr/>
-        <p:txBody>
-          <a:bodyPr/>
-          <a:lstStyle/>
-          <a:p>
-            <a:pPr lvl="0" marL="0" indent="0">
-              <a:buNone/>
-            </a:pPr>
-            <a:r>
-              <a:rPr/>
-              <a:t>Very</a:t>
-            </a:r>
-            <a:r>
-              <a:rPr/>
-              <a:t> </a:t>
-            </a:r>
-            <a:r>
-              <a:rPr/>
-              <a:t>High</a:t>
-            </a:r>
-            <a:r>
-              <a:rPr/>
-              <a:t> </a:t>
-            </a:r>
-            <a:r>
-              <a:rPr/>
-              <a:t>Serial</a:t>
-            </a:r>
-            <a:r>
-              <a:rPr/>
-              <a:t> </a:t>
-            </a:r>
-            <a:r>
-              <a:rPr/>
-              <a:t>Correlation</a:t>
-            </a:r>
-          </a:p>
-        </p:txBody>
-      </p:sp>
-      <mc:AlternateContent xmlns:mc="http://schemas.openxmlformats.org/markup-compatibility/2006">
-        <mc:Choice xmlns:a14="http://schemas.microsoft.com/office/drawing/2010/main" Requires="a14">
-          <p:sp>
-            <p:nvSpPr>
-              <p:cNvPr id="3" name="Content Placeholder 2"/>
-              <p:cNvSpPr>
-                <a:spLocks noGrp="1"/>
-              </p:cNvSpPr>
-              <p:nvPr>
-                <p:ph idx="1" sz="half"/>
-              </p:nvPr>
-            </p:nvSpPr>
-            <p:spPr/>
-            <p:txBody>
-              <a:bodyPr/>
-              <a:lstStyle/>
-              <a:p>
-                <a:pPr lvl="1"/>
-                <a:r>
-                  <a:rPr/>
-                  <a:t>Under very high serial correlation, most of the previous methods struggle to return the correct p-values.</a:t>
-                </a:r>
-              </a:p>
-              <a:p>
-                <a:pPr lvl="1"/>
-                <a:r>
-                  <a:rPr/>
-                  <a:t>If </a:t>
-                </a:r>
-                <a14:m>
-                  <m:oMath xmlns:m="http://schemas.openxmlformats.org/officeDocument/2006/math">
-                    <m:acc>
-                      <m:accPr>
-                        <m:chr m:val="̂"/>
-                      </m:accPr>
-                      <m:e>
-                        <m:r>
-                          <m:t>ρ</m:t>
-                        </m:r>
-                      </m:e>
-                    </m:acc>
-                  </m:oMath>
-                </a14:m>
-                <a:r>
-                  <a:rPr/>
-                  <a:t> is close to -1 or 1, then check for non-stationary errors (e.g., Phillips-Ouliaris Cointegration Test; Pesaran-Shin-Smith Cointegration Test).</a:t>
-                </a:r>
-              </a:p>
-            </p:txBody>
-          </p:sp>
-        </mc:Choice>
-      </mc:AlternateContent>
-      <p:graphicFrame>
-        <p:nvGraphicFramePr>
-          <p:cNvPr id="6" name="Content Placeholder 5"/>
-          <p:cNvGraphicFramePr>
-            <a:graphicFrameLocks noGrp="1"/>
-          </p:cNvGraphicFramePr>
-          <p:nvPr>
-            <p:ph idx="1"/>
-          </p:nvPr>
-        </p:nvGraphicFramePr>
-        <p:xfrm>
-          <a:off x="609600" y="3975100"/>
-          <a:ext cx="10972800" cy="2146300"/>
-        </p:xfrm>
-        <a:graphic>
-          <a:graphicData uri="http://schemas.openxmlformats.org/drawingml/2006/table">
-            <a:tbl>
-              <a:tblPr firstRow="1" bandRow="1">
-                <a:tableStyleId>{5C22544A-7EE6-4342-B048-85BDC9FD1C3A}</a:tableStyleId>
-              </a:tblPr>
-              <a:tblGrid>
-                <a:gridCol w="2743200"/>
-                <a:gridCol w="2743200"/>
-                <a:gridCol w="2743200"/>
-                <a:gridCol w="2743200"/>
-              </a:tblGrid>
-              <a:tr h="0">
-                <a:tc>
-                  <a:txBody>
-                    <a:bodyPr/>
-                    <a:lstStyle/>
-                    <a:p>
-                      <a:pPr lvl="0" marL="0" indent="0" algn="l">
-                        <a:buNone/>
-                      </a:pPr>
-                      <a:r>
-                        <a:rPr/>
-                        <a:t>rho</a:t>
-                      </a:r>
-                    </a:p>
-                  </a:txBody>
-                  <a:tcPr/>
-                </a:tc>
-                <a:tc>
-                  <a:txBody>
-                    <a:bodyPr/>
-                    <a:lstStyle/>
-                    <a:p>
-                      <a:pPr lvl="0" marL="0" indent="0" algn="l">
-                        <a:buNone/>
-                      </a:pPr>
-                      <a:r>
-                        <a:rPr/>
-                        <a:t>method</a:t>
-                      </a:r>
-                    </a:p>
-                  </a:txBody>
-                  <a:tcPr/>
-                </a:tc>
-                <a:tc>
-                  <a:txBody>
-                    <a:bodyPr/>
-                    <a:lstStyle/>
-                    <a:p>
-                      <a:pPr lvl="0" marL="0" indent="0" algn="r">
-                        <a:buNone/>
-                      </a:pPr>
-                      <a:r>
-                        <a:rPr/>
-                        <a:t>Prob_Type_1_Error</a:t>
-                      </a:r>
-                    </a:p>
-                  </a:txBody>
-                  <a:tcPr/>
-                </a:tc>
-                <a:tc>
-                  <a:txBody>
-                    <a:bodyPr/>
-                    <a:lstStyle/>
-                    <a:p>
-                      <a:pPr lvl="0" marL="0" indent="0" algn="r">
-                        <a:buNone/>
-                      </a:pPr>
-                      <a:r>
-                        <a:rPr/>
-                        <a:t>Avg_Test_RMSE</a:t>
-                      </a:r>
-                    </a:p>
-                  </a:txBody>
-                  <a:tcPr/>
-                </a:tc>
-              </a:tr>
-              <a:tr h="0">
-                <a:tc>
-                  <a:txBody>
-                    <a:bodyPr/>
-                    <a:lstStyle/>
-                    <a:p>
-                      <a:pPr lvl="0" marL="0" indent="0" algn="l">
-                        <a:buNone/>
-                      </a:pPr>
-                      <a:r>
-                        <a:rPr/>
-                        <a:t>3-Very</a:t>
-                      </a:r>
-                      <a:r>
-                        <a:rPr/>
-                        <a:t> </a:t>
-                      </a:r>
-                      <a:r>
-                        <a:rPr/>
-                        <a:t>High</a:t>
-                      </a:r>
-                      <a:r>
-                        <a:rPr/>
-                        <a:t> </a:t>
-                      </a:r>
-                      <a:r>
-                        <a:rPr/>
-                        <a:t>(0.9)</a:t>
-                      </a:r>
-                    </a:p>
-                  </a:txBody>
-                </a:tc>
-                <a:tc>
-                  <a:txBody>
-                    <a:bodyPr/>
-                    <a:lstStyle/>
-                    <a:p>
-                      <a:pPr lvl="0" marL="0" indent="0" algn="l">
-                        <a:buNone/>
-                      </a:pPr>
-                      <a:r>
-                        <a:rPr/>
-                        <a:t>gls</a:t>
-                      </a:r>
-                    </a:p>
-                  </a:txBody>
-                </a:tc>
-                <a:tc>
-                  <a:txBody>
-                    <a:bodyPr/>
-                    <a:lstStyle/>
-                    <a:p>
-                      <a:pPr lvl="0" marL="0" indent="0" algn="r">
-                        <a:buNone/>
-                      </a:pPr>
-                      <a:r>
-                        <a:rPr/>
-                        <a:t>0.096</a:t>
-                      </a:r>
-                    </a:p>
-                  </a:txBody>
-                </a:tc>
-                <a:tc>
-                  <a:txBody>
-                    <a:bodyPr/>
-                    <a:lstStyle/>
-                    <a:p>
-                      <a:pPr lvl="0" marL="0" indent="0" algn="r">
-                        <a:buNone/>
-                      </a:pPr>
-                      <a:r>
-                        <a:rPr/>
-                        <a:t>12.0</a:t>
-                      </a:r>
-                    </a:p>
-                  </a:txBody>
-                </a:tc>
-              </a:tr>
-              <a:tr h="0">
-                <a:tc>
-                  <a:txBody>
-                    <a:bodyPr/>
-                    <a:lstStyle/>
-                    <a:p>
-                      <a:pPr lvl="0" marL="0" indent="0" algn="l">
-                        <a:buNone/>
-                      </a:pPr>
-                      <a:r>
-                        <a:rPr/>
-                        <a:t>3-Very</a:t>
-                      </a:r>
-                      <a:r>
-                        <a:rPr/>
-                        <a:t> </a:t>
-                      </a:r>
-                      <a:r>
-                        <a:rPr/>
-                        <a:t>High</a:t>
-                      </a:r>
-                      <a:r>
-                        <a:rPr/>
-                        <a:t> </a:t>
-                      </a:r>
-                      <a:r>
-                        <a:rPr/>
-                        <a:t>(0.9)</a:t>
-                      </a:r>
-                    </a:p>
-                  </a:txBody>
-                </a:tc>
-                <a:tc>
-                  <a:txBody>
-                    <a:bodyPr/>
-                    <a:lstStyle/>
-                    <a:p>
-                      <a:pPr lvl="0" marL="0" indent="0" algn="l">
-                        <a:buNone/>
-                      </a:pPr>
-                      <a:r>
-                        <a:rPr/>
-                        <a:t>andrews</a:t>
-                      </a:r>
-                    </a:p>
-                  </a:txBody>
-                </a:tc>
-                <a:tc>
-                  <a:txBody>
-                    <a:bodyPr/>
-                    <a:lstStyle/>
-                    <a:p>
-                      <a:pPr lvl="0" marL="0" indent="0" algn="r">
-                        <a:buNone/>
-                      </a:pPr>
-                      <a:r>
-                        <a:rPr/>
-                        <a:t>0.186</a:t>
-                      </a:r>
-                    </a:p>
-                  </a:txBody>
-                </a:tc>
-                <a:tc>
-                  <a:txBody>
-                    <a:bodyPr/>
-                    <a:lstStyle/>
-                    <a:p>
-                      <a:pPr lvl="0" marL="0" indent="0" algn="r">
-                        <a:buNone/>
-                      </a:pPr>
-                      <a:r>
-                        <a:rPr/>
-                        <a:t>NA</a:t>
-                      </a:r>
-                    </a:p>
-                  </a:txBody>
-                </a:tc>
-              </a:tr>
-              <a:tr h="0">
-                <a:tc>
-                  <a:txBody>
-                    <a:bodyPr/>
-                    <a:lstStyle/>
-                    <a:p>
-                      <a:pPr lvl="0" marL="0" indent="0" algn="l">
-                        <a:buNone/>
-                      </a:pPr>
-                      <a:r>
-                        <a:rPr/>
-                        <a:t>3-Very</a:t>
-                      </a:r>
-                      <a:r>
-                        <a:rPr/>
-                        <a:t> </a:t>
-                      </a:r>
-                      <a:r>
-                        <a:rPr/>
-                        <a:t>High</a:t>
-                      </a:r>
-                      <a:r>
-                        <a:rPr/>
-                        <a:t> </a:t>
-                      </a:r>
-                      <a:r>
-                        <a:rPr/>
-                        <a:t>(0.9)</a:t>
-                      </a:r>
-                    </a:p>
-                  </a:txBody>
-                </a:tc>
-                <a:tc>
-                  <a:txBody>
-                    <a:bodyPr/>
-                    <a:lstStyle/>
-                    <a:p>
-                      <a:pPr lvl="0" marL="0" indent="0" algn="l">
-                        <a:buNone/>
-                      </a:pPr>
-                      <a:r>
-                        <a:rPr/>
-                        <a:t>nw</a:t>
-                      </a:r>
-                    </a:p>
-                  </a:txBody>
-                </a:tc>
-                <a:tc>
-                  <a:txBody>
-                    <a:bodyPr/>
-                    <a:lstStyle/>
-                    <a:p>
-                      <a:pPr lvl="0" marL="0" indent="0" algn="r">
-                        <a:buNone/>
-                      </a:pPr>
-                      <a:r>
-                        <a:rPr/>
-                        <a:t>0.195</a:t>
-                      </a:r>
-                    </a:p>
-                  </a:txBody>
-                </a:tc>
-                <a:tc>
-                  <a:txBody>
-                    <a:bodyPr/>
-                    <a:lstStyle/>
-                    <a:p>
-                      <a:pPr lvl="0" marL="0" indent="0" algn="r">
-                        <a:buNone/>
-                      </a:pPr>
-                      <a:r>
-                        <a:rPr/>
-                        <a:t>NA</a:t>
-                      </a:r>
-                    </a:p>
-                  </a:txBody>
-                </a:tc>
-              </a:tr>
-              <a:tr h="0">
-                <a:tc>
-                  <a:txBody>
-                    <a:bodyPr/>
-                    <a:lstStyle/>
-                    <a:p>
-                      <a:pPr lvl="0" marL="0" indent="0" algn="l">
-                        <a:buNone/>
-                      </a:pPr>
-                      <a:r>
-                        <a:rPr/>
-                        <a:t>3-Very</a:t>
-                      </a:r>
-                      <a:r>
-                        <a:rPr/>
-                        <a:t> </a:t>
-                      </a:r>
-                      <a:r>
-                        <a:rPr/>
-                        <a:t>High</a:t>
-                      </a:r>
-                      <a:r>
-                        <a:rPr/>
-                        <a:t> </a:t>
-                      </a:r>
-                      <a:r>
-                        <a:rPr/>
-                        <a:t>(0.9)</a:t>
-                      </a:r>
-                    </a:p>
-                  </a:txBody>
-                </a:tc>
-                <a:tc>
-                  <a:txBody>
-                    <a:bodyPr/>
-                    <a:lstStyle/>
-                    <a:p>
-                      <a:pPr lvl="0" marL="0" indent="0" algn="l">
-                        <a:buNone/>
-                      </a:pPr>
-                      <a:r>
-                        <a:rPr/>
-                        <a:t>bootstrap</a:t>
-                      </a:r>
-                    </a:p>
-                  </a:txBody>
-                </a:tc>
-                <a:tc>
-                  <a:txBody>
-                    <a:bodyPr/>
-                    <a:lstStyle/>
-                    <a:p>
-                      <a:pPr lvl="0" marL="0" indent="0" algn="r">
-                        <a:buNone/>
-                      </a:pPr>
-                      <a:r>
-                        <a:rPr/>
-                        <a:t>0.233</a:t>
-                      </a:r>
-                    </a:p>
-                  </a:txBody>
-                </a:tc>
-                <a:tc>
-                  <a:txBody>
-                    <a:bodyPr/>
-                    <a:lstStyle/>
-                    <a:p>
-                      <a:pPr lvl="0" marL="0" indent="0" algn="r">
-                        <a:buNone/>
-                      </a:pPr>
-                      <a:r>
-                        <a:rPr/>
-                        <a:t>NA</a:t>
-                      </a:r>
-                    </a:p>
-                  </a:txBody>
-                </a:tc>
-              </a:tr>
-              <a:tr h="0">
-                <a:tc>
-                  <a:txBody>
-                    <a:bodyPr/>
-                    <a:lstStyle/>
-                    <a:p>
-                      <a:pPr lvl="0" marL="0" indent="0" algn="l">
-                        <a:buNone/>
-                      </a:pPr>
-                      <a:r>
-                        <a:rPr/>
-                        <a:t>3-Very</a:t>
-                      </a:r>
-                      <a:r>
-                        <a:rPr/>
-                        <a:t> </a:t>
-                      </a:r>
-                      <a:r>
-                        <a:rPr/>
-                        <a:t>High</a:t>
-                      </a:r>
-                      <a:r>
-                        <a:rPr/>
-                        <a:t> </a:t>
-                      </a:r>
-                      <a:r>
-                        <a:rPr/>
-                        <a:t>(0.9)</a:t>
-                      </a:r>
-                    </a:p>
-                  </a:txBody>
-                </a:tc>
-                <a:tc>
-                  <a:txBody>
-                    <a:bodyPr/>
-                    <a:lstStyle/>
-                    <a:p>
-                      <a:pPr lvl="0" marL="0" indent="0" algn="l">
-                        <a:buNone/>
-                      </a:pPr>
-                      <a:r>
-                        <a:rPr/>
-                        <a:t>lm</a:t>
-                      </a:r>
-                    </a:p>
-                  </a:txBody>
-                </a:tc>
-                <a:tc>
-                  <a:txBody>
-                    <a:bodyPr/>
-                    <a:lstStyle/>
-                    <a:p>
-                      <a:pPr lvl="0" marL="0" indent="0" algn="r">
-                        <a:buNone/>
-                      </a:pPr>
-                      <a:r>
-                        <a:rPr/>
-                        <a:t>0.550</a:t>
-                      </a:r>
-                    </a:p>
-                  </a:txBody>
-                </a:tc>
-                <a:tc>
-                  <a:txBody>
-                    <a:bodyPr/>
-                    <a:lstStyle/>
-                    <a:p>
-                      <a:pPr lvl="0" marL="0" indent="0" algn="r">
-                        <a:buNone/>
-                      </a:pPr>
-                      <a:r>
-                        <a:rPr/>
-                        <a:t>12.7</a:t>
-                      </a:r>
-                    </a:p>
-                  </a:txBody>
-                </a:tc>
-              </a:tr>
-            </a:tbl>
-          </a:graphicData>
-        </a:graphic>
-      </p:graphicFrame>
     </p:spTree>
   </p:cSld>
 </p:sld>
@@ -10340,23 +10341,7 @@
             </a:r>
             <a:r>
               <a:rPr/>
-              <a:t>(first</a:t>
-            </a:r>
-            <a:r>
-              <a:rPr/>
-              <a:t> </a:t>
-            </a:r>
-            <a:r>
-              <a:rPr/>
-              <a:t>50</a:t>
-            </a:r>
-            <a:r>
-              <a:rPr/>
-              <a:t> </a:t>
-            </a:r>
-            <a:r>
-              <a:rPr/>
-              <a:t>obs)</a:t>
+              <a:t>(Train)</a:t>
             </a:r>
           </a:p>
         </p:txBody>
@@ -11332,7 +11317,7 @@
             </a:pPr>
             <a:r>
               <a:rPr/>
-              <a:t>Remediating</a:t>
+              <a:t>Non-stationarity</a:t>
             </a:r>
             <a:r>
               <a:rPr/>
@@ -11340,7 +11325,7 @@
             </a:r>
             <a:r>
               <a:rPr/>
-              <a:t>non-stationary</a:t>
+              <a:t>is</a:t>
             </a:r>
             <a:r>
               <a:rPr/>
@@ -11348,7 +11333,31 @@
             </a:r>
             <a:r>
               <a:rPr/>
-              <a:t>errors</a:t>
+              <a:t>a</a:t>
+            </a:r>
+            <a:r>
+              <a:rPr/>
+              <a:t> </a:t>
+            </a:r>
+            <a:r>
+              <a:rPr/>
+              <a:t>very</a:t>
+            </a:r>
+            <a:r>
+              <a:rPr/>
+              <a:t> </a:t>
+            </a:r>
+            <a:r>
+              <a:rPr/>
+              <a:t>big</a:t>
+            </a:r>
+            <a:r>
+              <a:rPr/>
+              <a:t> </a:t>
+            </a:r>
+            <a:r>
+              <a:rPr/>
+              <a:t>problem</a:t>
             </a:r>
           </a:p>
         </p:txBody>
@@ -11362,7 +11371,7 @@
                 <a:spLocks noGrp="1"/>
               </p:cNvSpPr>
               <p:nvPr>
-                <p:ph idx="1"/>
+                <p:ph idx="1" sz="half"/>
               </p:nvPr>
             </p:nvSpPr>
             <p:spPr/>
@@ -11370,213 +11379,411 @@
               <a:bodyPr/>
               <a:lstStyle/>
               <a:p>
-                <a:pPr lvl="1">
-                  <a:buAutoNum type="arabicPeriod"/>
-                </a:pPr>
+                <a:pPr lvl="1"/>
                 <a:r>
                   <a:rPr/>
-                  <a:t>Transform each response and predictor into “first differences” (e.g., </a:t>
+                  <a:t>Simulate </a:t>
                 </a:r>
                 <a14:m>
                   <m:oMath xmlns:m="http://schemas.openxmlformats.org/officeDocument/2006/math">
-                    <m:sSub>
-                      <m:e>
-                        <m:r>
-                          <m:t>y</m:t>
-                        </m:r>
-                      </m:e>
-                      <m:sub>
-                        <m:r>
-                          <m:t>t</m:t>
-                        </m:r>
-                      </m:sub>
-                    </m:sSub>
                     <m:r>
-                      <m:rPr>
-                        <m:sty m:val="p"/>
-                      </m:rPr>
-                      <m:t>−</m:t>
+                      <m:t>K</m:t>
                     </m:r>
-                    <m:sSub>
-                      <m:e>
-                        <m:r>
-                          <m:t>y</m:t>
-                        </m:r>
-                      </m:e>
-                      <m:sub>
-                        <m:r>
-                          <m:t>t</m:t>
-                        </m:r>
-                        <m:r>
-                          <m:rPr>
-                            <m:sty m:val="p"/>
-                          </m:rPr>
-                          <m:t>−</m:t>
-                        </m:r>
-                        <m:r>
-                          <m:t>1</m:t>
-                        </m:r>
-                      </m:sub>
-                    </m:sSub>
-                  </m:oMath>
-                </a14:m>
-                <a:r>
-                  <a:rPr/>
-                  <a:t>)</a:t>
-                </a:r>
-              </a:p>
-              <a:p>
-                <a:pPr lvl="1">
-                  <a:buAutoNum type="arabicPeriod"/>
-                </a:pPr>
-                <a:r>
-                  <a:rPr/>
-                  <a:t>Estimate the transformed model using OLS or GLS</a:t>
-                </a:r>
-              </a:p>
-              <a:p>
-                <a:pPr lvl="1">
-                  <a:buAutoNum type="arabicPeriod"/>
-                </a:pPr>
-                <a:r>
-                  <a:rPr/>
-                  <a:t>Forecast with the last historical value and the cumulative sum of the predicted first differences:</a:t>
-                </a:r>
-              </a:p>
-              <a:p>
-                <a:pPr lvl="0" marL="0" indent="0">
-                  <a:buNone/>
-                </a:pPr>
-                <a14:m>
-                  <m:oMath xmlns:m="http://schemas.openxmlformats.org/officeDocument/2006/math">
-                    <m:acc>
-                      <m:accPr>
-                        <m:chr m:val="̂"/>
-                      </m:accPr>
-                      <m:e>
-                        <m:sSub>
-                          <m:e>
-                            <m:r>
-                              <m:t>y</m:t>
-                            </m:r>
-                          </m:e>
-                          <m:sub>
-                            <m:r>
-                              <m:t>t</m:t>
-                            </m:r>
-                            <m:r>
-                              <m:rPr>
-                                <m:sty m:val="p"/>
-                              </m:rPr>
-                              <m:t>+</m:t>
-                            </m:r>
-                            <m:r>
-                              <m:t>h</m:t>
-                            </m:r>
-                          </m:sub>
-                        </m:sSub>
-                      </m:e>
-                    </m:acc>
                     <m:r>
                       <m:rPr>
                         <m:sty m:val="p"/>
                       </m:rPr>
                       <m:t>=</m:t>
                     </m:r>
-                    <m:sSub>
-                      <m:e>
-                        <m:r>
-                          <m:t>y</m:t>
-                        </m:r>
-                      </m:e>
-                      <m:sub>
-                        <m:r>
-                          <m:t>t</m:t>
-                        </m:r>
-                      </m:sub>
-                    </m:sSub>
                     <m:r>
-                      <m:rPr>
-                        <m:sty m:val="p"/>
-                      </m:rPr>
-                      <m:t>+</m:t>
+                      <m:t>1000</m:t>
                     </m:r>
-                    <m:nary>
-                      <m:naryPr>
-                        <m:chr m:val="∑"/>
-                        <m:limLoc m:val="undOvr"/>
-                        <m:subHide m:val="0"/>
-                        <m:supHide m:val="0"/>
-                      </m:naryPr>
-                      <m:sub>
-                        <m:r>
-                          <m:t>i</m:t>
-                        </m:r>
-                        <m:r>
-                          <m:rPr>
-                            <m:sty m:val="p"/>
-                          </m:rPr>
-                          <m:t>=</m:t>
-                        </m:r>
-                        <m:r>
-                          <m:t>t</m:t>
-                        </m:r>
-                        <m:r>
-                          <m:rPr>
-                            <m:sty m:val="p"/>
-                          </m:rPr>
-                          <m:t>+</m:t>
-                        </m:r>
-                        <m:r>
-                          <m:t>1</m:t>
-                        </m:r>
-                      </m:sub>
-                      <m:sup>
-                        <m:r>
-                          <m:t>t</m:t>
-                        </m:r>
-                        <m:r>
-                          <m:rPr>
-                            <m:sty m:val="p"/>
-                          </m:rPr>
-                          <m:t>+</m:t>
-                        </m:r>
-                        <m:r>
-                          <m:t>h</m:t>
-                        </m:r>
-                      </m:sup>
-                      <m:e>
-                        <m:acc>
-                          <m:accPr>
-                            <m:chr m:val="̂"/>
-                          </m:accPr>
-                          <m:e>
-                            <m:r>
-                              <m:t>Δ</m:t>
-                            </m:r>
-                            <m:sSub>
-                              <m:e>
-                                <m:r>
-                                  <m:t>y</m:t>
-                                </m:r>
-                              </m:e>
-                              <m:sub>
-                                <m:r>
-                                  <m:t>i</m:t>
-                                </m:r>
-                              </m:sub>
-                            </m:sSub>
-                          </m:e>
-                        </m:acc>
-                      </m:e>
-                    </m:nary>
                   </m:oMath>
                 </a14:m>
+                <a:r>
+                  <a:rPr/>
+                  <a:t> data sets where the response and predictors are independent random walks (non-stationary)</a:t>
+                </a:r>
+              </a:p>
+              <a:p>
+                <a:pPr lvl="1"/>
+                <a:r>
+                  <a:rPr/>
+                  <a:t>OLS inferences are highly unreliable</a:t>
+                </a:r>
+              </a:p>
+              <a:p>
+                <a:pPr lvl="1"/>
+                <a:r>
+                  <a:rPr/>
+                  <a:t>OLS and GLS both perform worse than a naive model (i.e., take the last response from the training set and assume the response never changes in the test set)</a:t>
+                </a:r>
               </a:p>
             </p:txBody>
           </p:sp>
         </mc:Choice>
       </mc:AlternateContent>
+      <p:graphicFrame>
+        <p:nvGraphicFramePr>
+          <p:cNvPr id="6" name="Content Placeholder 5"/>
+          <p:cNvGraphicFramePr>
+            <a:graphicFrameLocks noGrp="1"/>
+          </p:cNvGraphicFramePr>
+          <p:nvPr>
+            <p:ph idx="1"/>
+          </p:nvPr>
+        </p:nvGraphicFramePr>
+        <p:xfrm>
+          <a:off x="609600" y="3975100"/>
+          <a:ext cx="10972800" cy="2146300"/>
+        </p:xfrm>
+        <a:graphic>
+          <a:graphicData uri="http://schemas.openxmlformats.org/drawingml/2006/table">
+            <a:tbl>
+              <a:tblPr firstRow="1" bandRow="1">
+                <a:tableStyleId>{5C22544A-7EE6-4342-B048-85BDC9FD1C3A}</a:tableStyleId>
+              </a:tblPr>
+              <a:tblGrid>
+                <a:gridCol w="3657600"/>
+                <a:gridCol w="3657600"/>
+                <a:gridCol w="3657600"/>
+              </a:tblGrid>
+              <a:tr h="0">
+                <a:tc>
+                  <a:txBody>
+                    <a:bodyPr/>
+                    <a:lstStyle/>
+                    <a:p>
+                      <a:pPr lvl="0" marL="0" indent="0" algn="l">
+                        <a:buNone/>
+                      </a:pPr>
+                      <a:r>
+                        <a:rPr/>
+                        <a:t>method</a:t>
+                      </a:r>
+                    </a:p>
+                  </a:txBody>
+                  <a:tcPr/>
+                </a:tc>
+                <a:tc>
+                  <a:txBody>
+                    <a:bodyPr/>
+                    <a:lstStyle/>
+                    <a:p>
+                      <a:pPr lvl="0" marL="0" indent="0" algn="r">
+                        <a:buNone/>
+                      </a:pPr>
+                      <a:r>
+                        <a:rPr/>
+                        <a:t>Prob_Type_1_Error</a:t>
+                      </a:r>
+                    </a:p>
+                  </a:txBody>
+                  <a:tcPr/>
+                </a:tc>
+                <a:tc>
+                  <a:txBody>
+                    <a:bodyPr/>
+                    <a:lstStyle/>
+                    <a:p>
+                      <a:pPr lvl="0" marL="0" indent="0" algn="r">
+                        <a:buNone/>
+                      </a:pPr>
+                      <a:r>
+                        <a:rPr/>
+                        <a:t>Avg_Test_RMSE</a:t>
+                      </a:r>
+                    </a:p>
+                  </a:txBody>
+                  <a:tcPr/>
+                </a:tc>
+              </a:tr>
+              <a:tr h="0">
+                <a:tc>
+                  <a:txBody>
+                    <a:bodyPr/>
+                    <a:lstStyle/>
+                    <a:p>
+                      <a:pPr lvl="0" marL="0" indent="0" algn="l">
+                        <a:buNone/>
+                      </a:pPr>
+                      <a:r>
+                        <a:rPr/>
+                        <a:t>rw</a:t>
+                      </a:r>
+                    </a:p>
+                  </a:txBody>
+                </a:tc>
+                <a:tc>
+                  <a:txBody>
+                    <a:bodyPr/>
+                    <a:lstStyle/>
+                    <a:p>
+                      <a:pPr lvl="0" marL="0" indent="0" algn="r">
+                        <a:buNone/>
+                      </a:pPr>
+                      <a:r>
+                        <a:rPr/>
+                        <a:t>0.000</a:t>
+                      </a:r>
+                    </a:p>
+                  </a:txBody>
+                </a:tc>
+                <a:tc>
+                  <a:txBody>
+                    <a:bodyPr/>
+                    <a:lstStyle/>
+                    <a:p>
+                      <a:pPr lvl="0" marL="0" indent="0" algn="r">
+                        <a:buNone/>
+                      </a:pPr>
+                      <a:r>
+                        <a:rPr/>
+                        <a:t>25.6</a:t>
+                      </a:r>
+                    </a:p>
+                  </a:txBody>
+                </a:tc>
+              </a:tr>
+              <a:tr h="0">
+                <a:tc>
+                  <a:txBody>
+                    <a:bodyPr/>
+                    <a:lstStyle/>
+                    <a:p>
+                      <a:pPr lvl="0" marL="0" indent="0" algn="l">
+                        <a:buNone/>
+                      </a:pPr>
+                      <a:r>
+                        <a:rPr/>
+                        <a:t>gls</a:t>
+                      </a:r>
+                    </a:p>
+                  </a:txBody>
+                </a:tc>
+                <a:tc>
+                  <a:txBody>
+                    <a:bodyPr/>
+                    <a:lstStyle/>
+                    <a:p>
+                      <a:pPr lvl="0" marL="0" indent="0" algn="r">
+                        <a:buNone/>
+                      </a:pPr>
+                      <a:r>
+                        <a:rPr/>
+                        <a:t>0.148</a:t>
+                      </a:r>
+                    </a:p>
+                  </a:txBody>
+                </a:tc>
+                <a:tc>
+                  <a:txBody>
+                    <a:bodyPr/>
+                    <a:lstStyle/>
+                    <a:p>
+                      <a:pPr lvl="0" marL="0" indent="0" algn="r">
+                        <a:buNone/>
+                      </a:pPr>
+                      <a:r>
+                        <a:rPr/>
+                        <a:t>31.3</a:t>
+                      </a:r>
+                    </a:p>
+                  </a:txBody>
+                </a:tc>
+              </a:tr>
+              <a:tr h="0">
+                <a:tc>
+                  <a:txBody>
+                    <a:bodyPr/>
+                    <a:lstStyle/>
+                    <a:p>
+                      <a:pPr lvl="0" marL="0" indent="0" algn="l">
+                        <a:buNone/>
+                      </a:pPr>
+                      <a:r>
+                        <a:rPr/>
+                        <a:t>andrews</a:t>
+                      </a:r>
+                    </a:p>
+                  </a:txBody>
+                </a:tc>
+                <a:tc>
+                  <a:txBody>
+                    <a:bodyPr/>
+                    <a:lstStyle/>
+                    <a:p>
+                      <a:pPr lvl="0" marL="0" indent="0" algn="r">
+                        <a:buNone/>
+                      </a:pPr>
+                      <a:r>
+                        <a:rPr/>
+                        <a:t>0.290</a:t>
+                      </a:r>
+                    </a:p>
+                  </a:txBody>
+                </a:tc>
+                <a:tc>
+                  <a:txBody>
+                    <a:bodyPr/>
+                    <a:lstStyle/>
+                    <a:p>
+                      <a:pPr lvl="0" marL="0" indent="0" algn="r">
+                        <a:buNone/>
+                      </a:pPr>
+                      <a:r>
+                        <a:rPr/>
+                        <a:t>NA</a:t>
+                      </a:r>
+                    </a:p>
+                  </a:txBody>
+                </a:tc>
+              </a:tr>
+              <a:tr h="0">
+                <a:tc>
+                  <a:txBody>
+                    <a:bodyPr/>
+                    <a:lstStyle/>
+                    <a:p>
+                      <a:pPr lvl="0" marL="0" indent="0" algn="l">
+                        <a:buNone/>
+                      </a:pPr>
+                      <a:r>
+                        <a:rPr/>
+                        <a:t>nw</a:t>
+                      </a:r>
+                    </a:p>
+                  </a:txBody>
+                </a:tc>
+                <a:tc>
+                  <a:txBody>
+                    <a:bodyPr/>
+                    <a:lstStyle/>
+                    <a:p>
+                      <a:pPr lvl="0" marL="0" indent="0" algn="r">
+                        <a:buNone/>
+                      </a:pPr>
+                      <a:r>
+                        <a:rPr/>
+                        <a:t>0.290</a:t>
+                      </a:r>
+                    </a:p>
+                  </a:txBody>
+                </a:tc>
+                <a:tc>
+                  <a:txBody>
+                    <a:bodyPr/>
+                    <a:lstStyle/>
+                    <a:p>
+                      <a:pPr lvl="0" marL="0" indent="0" algn="r">
+                        <a:buNone/>
+                      </a:pPr>
+                      <a:r>
+                        <a:rPr/>
+                        <a:t>NA</a:t>
+                      </a:r>
+                    </a:p>
+                  </a:txBody>
+                </a:tc>
+              </a:tr>
+              <a:tr h="0">
+                <a:tc>
+                  <a:txBody>
+                    <a:bodyPr/>
+                    <a:lstStyle/>
+                    <a:p>
+                      <a:pPr lvl="0" marL="0" indent="0" algn="l">
+                        <a:buNone/>
+                      </a:pPr>
+                      <a:r>
+                        <a:rPr/>
+                        <a:t>bootstrap</a:t>
+                      </a:r>
+                    </a:p>
+                  </a:txBody>
+                </a:tc>
+                <a:tc>
+                  <a:txBody>
+                    <a:bodyPr/>
+                    <a:lstStyle/>
+                    <a:p>
+                      <a:pPr lvl="0" marL="0" indent="0" algn="r">
+                        <a:buNone/>
+                      </a:pPr>
+                      <a:r>
+                        <a:rPr/>
+                        <a:t>0.346</a:t>
+                      </a:r>
+                    </a:p>
+                  </a:txBody>
+                </a:tc>
+                <a:tc>
+                  <a:txBody>
+                    <a:bodyPr/>
+                    <a:lstStyle/>
+                    <a:p>
+                      <a:pPr lvl="0" marL="0" indent="0" algn="r">
+                        <a:buNone/>
+                      </a:pPr>
+                      <a:r>
+                        <a:rPr/>
+                        <a:t>NA</a:t>
+                      </a:r>
+                    </a:p>
+                  </a:txBody>
+                </a:tc>
+              </a:tr>
+              <a:tr h="0">
+                <a:tc>
+                  <a:txBody>
+                    <a:bodyPr/>
+                    <a:lstStyle/>
+                    <a:p>
+                      <a:pPr lvl="0" marL="0" indent="0" algn="l">
+                        <a:buNone/>
+                      </a:pPr>
+                      <a:r>
+                        <a:rPr/>
+                        <a:t>lm</a:t>
+                      </a:r>
+                    </a:p>
+                  </a:txBody>
+                </a:tc>
+                <a:tc>
+                  <a:txBody>
+                    <a:bodyPr/>
+                    <a:lstStyle/>
+                    <a:p>
+                      <a:pPr lvl="0" marL="0" indent="0" algn="r">
+                        <a:buNone/>
+                      </a:pPr>
+                      <a:r>
+                        <a:rPr/>
+                        <a:t>0.743</a:t>
+                      </a:r>
+                    </a:p>
+                  </a:txBody>
+                </a:tc>
+                <a:tc>
+                  <a:txBody>
+                    <a:bodyPr/>
+                    <a:lstStyle/>
+                    <a:p>
+                      <a:pPr lvl="0" marL="0" indent="0" algn="r">
+                        <a:buNone/>
+                      </a:pPr>
+                      <a:r>
+                        <a:rPr/>
+                        <a:t>39.2</a:t>
+                      </a:r>
+                    </a:p>
+                  </a:txBody>
+                </a:tc>
+              </a:tr>
+            </a:tbl>
+          </a:graphicData>
+        </a:graphic>
+      </p:graphicFrame>
     </p:spTree>
   </p:cSld>
 </p:sld>
@@ -11949,6 +12156,293 @@
 </file>
 
 <file path=ppt/slides/slide30.xml><?xml version="1.0" encoding="utf-8"?>
+<p:sld xmlns:a="http://schemas.openxmlformats.org/drawingml/2006/main" xmlns:r="http://schemas.openxmlformats.org/officeDocument/2006/relationships" xmlns:p="http://schemas.openxmlformats.org/presentationml/2006/main">
+  <p:cSld>
+    <p:spTree>
+      <p:nvGrpSpPr>
+        <p:cNvPr id="1" name=""/>
+        <p:cNvGrpSpPr/>
+        <p:nvPr/>
+      </p:nvGrpSpPr>
+      <p:grpSpPr>
+        <a:xfrm>
+          <a:off x="0" y="0"/>
+          <a:ext cx="0" cy="0"/>
+          <a:chOff x="0" y="0"/>
+          <a:chExt cx="0" cy="0"/>
+        </a:xfrm>
+      </p:grpSpPr>
+      <p:sp>
+        <p:nvSpPr>
+          <p:cNvPr id="2" name="Title 1"/>
+          <p:cNvSpPr>
+            <a:spLocks noGrp="1"/>
+          </p:cNvSpPr>
+          <p:nvPr>
+            <p:ph type="title"/>
+          </p:nvPr>
+        </p:nvSpPr>
+        <p:spPr/>
+        <p:txBody>
+          <a:bodyPr/>
+          <a:lstStyle/>
+          <a:p>
+            <a:pPr lvl="0" marL="0" indent="0">
+              <a:buNone/>
+            </a:pPr>
+            <a:r>
+              <a:rPr/>
+              <a:t>Remediating</a:t>
+            </a:r>
+            <a:r>
+              <a:rPr/>
+              <a:t> </a:t>
+            </a:r>
+            <a:r>
+              <a:rPr/>
+              <a:t>non-stationary</a:t>
+            </a:r>
+            <a:r>
+              <a:rPr/>
+              <a:t> </a:t>
+            </a:r>
+            <a:r>
+              <a:rPr/>
+              <a:t>errors</a:t>
+            </a:r>
+          </a:p>
+        </p:txBody>
+      </p:sp>
+      <mc:AlternateContent xmlns:mc="http://schemas.openxmlformats.org/markup-compatibility/2006">
+        <mc:Choice xmlns:a14="http://schemas.microsoft.com/office/drawing/2010/main" Requires="a14">
+          <p:sp>
+            <p:nvSpPr>
+              <p:cNvPr id="3" name="Content Placeholder 2"/>
+              <p:cNvSpPr>
+                <a:spLocks noGrp="1"/>
+              </p:cNvSpPr>
+              <p:nvPr>
+                <p:ph idx="1"/>
+              </p:nvPr>
+            </p:nvSpPr>
+            <p:spPr/>
+            <p:txBody>
+              <a:bodyPr/>
+              <a:lstStyle/>
+              <a:p>
+                <a:pPr lvl="1">
+                  <a:buAutoNum type="arabicPeriod"/>
+                </a:pPr>
+                <a:r>
+                  <a:rPr/>
+                  <a:t>Transform each response and predictor into “first differences” (e.g., </a:t>
+                </a:r>
+                <a14:m>
+                  <m:oMath xmlns:m="http://schemas.openxmlformats.org/officeDocument/2006/math">
+                    <m:sSub>
+                      <m:e>
+                        <m:r>
+                          <m:t>y</m:t>
+                        </m:r>
+                      </m:e>
+                      <m:sub>
+                        <m:r>
+                          <m:t>t</m:t>
+                        </m:r>
+                      </m:sub>
+                    </m:sSub>
+                    <m:r>
+                      <m:rPr>
+                        <m:sty m:val="p"/>
+                      </m:rPr>
+                      <m:t>−</m:t>
+                    </m:r>
+                    <m:sSub>
+                      <m:e>
+                        <m:r>
+                          <m:t>y</m:t>
+                        </m:r>
+                      </m:e>
+                      <m:sub>
+                        <m:r>
+                          <m:t>t</m:t>
+                        </m:r>
+                        <m:r>
+                          <m:rPr>
+                            <m:sty m:val="p"/>
+                          </m:rPr>
+                          <m:t>−</m:t>
+                        </m:r>
+                        <m:r>
+                          <m:t>1</m:t>
+                        </m:r>
+                      </m:sub>
+                    </m:sSub>
+                  </m:oMath>
+                </a14:m>
+                <a:r>
+                  <a:rPr/>
+                  <a:t>)</a:t>
+                </a:r>
+              </a:p>
+              <a:p>
+                <a:pPr lvl="1">
+                  <a:buAutoNum type="arabicPeriod"/>
+                </a:pPr>
+                <a:r>
+                  <a:rPr/>
+                  <a:t>Estimate the transformed model using OLS or GLS</a:t>
+                </a:r>
+              </a:p>
+              <a:p>
+                <a:pPr lvl="1">
+                  <a:buAutoNum type="arabicPeriod"/>
+                </a:pPr>
+                <a:r>
+                  <a:rPr/>
+                  <a:t>Forecast with the last historical value and the cumulative sum of the predicted first differences:</a:t>
+                </a:r>
+              </a:p>
+              <a:p>
+                <a:pPr lvl="0" marL="0" indent="0">
+                  <a:buNone/>
+                </a:pPr>
+                <a14:m>
+                  <m:oMath xmlns:m="http://schemas.openxmlformats.org/officeDocument/2006/math">
+                    <m:acc>
+                      <m:accPr>
+                        <m:chr m:val="̂"/>
+                      </m:accPr>
+                      <m:e>
+                        <m:sSub>
+                          <m:e>
+                            <m:r>
+                              <m:t>y</m:t>
+                            </m:r>
+                          </m:e>
+                          <m:sub>
+                            <m:r>
+                              <m:t>t</m:t>
+                            </m:r>
+                            <m:r>
+                              <m:rPr>
+                                <m:sty m:val="p"/>
+                              </m:rPr>
+                              <m:t>+</m:t>
+                            </m:r>
+                            <m:r>
+                              <m:t>h</m:t>
+                            </m:r>
+                          </m:sub>
+                        </m:sSub>
+                      </m:e>
+                    </m:acc>
+                    <m:r>
+                      <m:rPr>
+                        <m:sty m:val="p"/>
+                      </m:rPr>
+                      <m:t>=</m:t>
+                    </m:r>
+                    <m:sSub>
+                      <m:e>
+                        <m:r>
+                          <m:t>y</m:t>
+                        </m:r>
+                      </m:e>
+                      <m:sub>
+                        <m:r>
+                          <m:t>t</m:t>
+                        </m:r>
+                      </m:sub>
+                    </m:sSub>
+                    <m:r>
+                      <m:rPr>
+                        <m:sty m:val="p"/>
+                      </m:rPr>
+                      <m:t>+</m:t>
+                    </m:r>
+                    <m:nary>
+                      <m:naryPr>
+                        <m:chr m:val="∑"/>
+                        <m:limLoc m:val="undOvr"/>
+                        <m:subHide m:val="0"/>
+                        <m:supHide m:val="0"/>
+                      </m:naryPr>
+                      <m:sub>
+                        <m:r>
+                          <m:t>i</m:t>
+                        </m:r>
+                        <m:r>
+                          <m:rPr>
+                            <m:sty m:val="p"/>
+                          </m:rPr>
+                          <m:t>=</m:t>
+                        </m:r>
+                        <m:r>
+                          <m:t>t</m:t>
+                        </m:r>
+                        <m:r>
+                          <m:rPr>
+                            <m:sty m:val="p"/>
+                          </m:rPr>
+                          <m:t>+</m:t>
+                        </m:r>
+                        <m:r>
+                          <m:t>1</m:t>
+                        </m:r>
+                      </m:sub>
+                      <m:sup>
+                        <m:r>
+                          <m:t>t</m:t>
+                        </m:r>
+                        <m:r>
+                          <m:rPr>
+                            <m:sty m:val="p"/>
+                          </m:rPr>
+                          <m:t>+</m:t>
+                        </m:r>
+                        <m:r>
+                          <m:t>h</m:t>
+                        </m:r>
+                      </m:sup>
+                      <m:e>
+                        <m:acc>
+                          <m:accPr>
+                            <m:chr m:val="̂"/>
+                          </m:accPr>
+                          <m:e>
+                            <m:r>
+                              <m:t>Δ</m:t>
+                            </m:r>
+                            <m:sSub>
+                              <m:e>
+                                <m:r>
+                                  <m:t>y</m:t>
+                                </m:r>
+                              </m:e>
+                              <m:sub>
+                                <m:r>
+                                  <m:t>i</m:t>
+                                </m:r>
+                              </m:sub>
+                            </m:sSub>
+                          </m:e>
+                        </m:acc>
+                      </m:e>
+                    </m:nary>
+                  </m:oMath>
+                </a14:m>
+              </a:p>
+            </p:txBody>
+          </p:sp>
+        </mc:Choice>
+      </mc:AlternateContent>
+    </p:spTree>
+  </p:cSld>
+</p:sld>
+</file>
+
+<file path=ppt/slides/slide31.xml><?xml version="1.0" encoding="utf-8"?>
 <p:sld xmlns:a="http://schemas.openxmlformats.org/drawingml/2006/main" xmlns:r="http://schemas.openxmlformats.org/officeDocument/2006/relationships" xmlns:p="http://schemas.openxmlformats.org/presentationml/2006/main">
   <p:cSld>
     <p:spTree>
@@ -14432,23 +14926,7 @@
             </a:r>
             <a:r>
               <a:rPr/>
-              <a:t>(first</a:t>
-            </a:r>
-            <a:r>
-              <a:rPr/>
-              <a:t> </a:t>
-            </a:r>
-            <a:r>
-              <a:rPr/>
-              <a:t>50</a:t>
-            </a:r>
-            <a:r>
-              <a:rPr/>
-              <a:t> </a:t>
-            </a:r>
-            <a:r>
-              <a:rPr/>
-              <a:t>obs)</a:t>
+              <a:t>(Train)</a:t>
             </a:r>
           </a:p>
         </p:txBody>

</xml_diff>

<commit_message>
increased Ksim to 25,000
</commit_message>
<xml_diff>
--- a/time_series_regression.pptx
+++ b/time_series_regression.pptx
@@ -3517,7 +3517,7 @@
           <a:p>
             <a:fld id="{25078A64-5338-724D-9253-210B3CE97A87}" type="datetime4">
               <a:rPr lang="en-US" smtClean="0"/>
-              <a:t>2/23/2022</a:t>
+              <a:t>3/10/2022</a:t>
             </a:fld>
             <a:endParaRPr lang="en-US"/>
           </a:p>
@@ -3805,7 +3805,7 @@
           <a:p>
             <a:fld id="{25078A64-5338-724D-9253-210B3CE97A87}" type="datetime4">
               <a:rPr lang="en-US" smtClean="0"/>
-              <a:t>2/23/2022</a:t>
+              <a:t>3/10/2022</a:t>
             </a:fld>
             <a:endParaRPr lang="en-US"/>
           </a:p>
@@ -3912,7 +3912,7 @@
           <a:p>
             <a:fld id="{78D1BCE1-314F-5145-B548-25B12CA3616C}" type="datetime4">
               <a:rPr lang="en-US" smtClean="0"/>
-              <a:t>2/23/2022</a:t>
+              <a:t>3/10/2022</a:t>
             </a:fld>
             <a:endParaRPr dirty="0" lang="en-US"/>
           </a:p>
@@ -4523,7 +4523,7 @@
           <a:p>
             <a:fld id="{25078A64-5338-724D-9253-210B3CE97A87}" type="datetime4">
               <a:rPr lang="en-US" smtClean="0"/>
-              <a:t>2/23/2022</a:t>
+              <a:t>3/10/2022</a:t>
             </a:fld>
             <a:endParaRPr lang="en-US"/>
           </a:p>
@@ -5037,7 +5037,7 @@
           <a:p>
             <a:fld id="{25078A64-5338-724D-9253-210B3CE97A87}" type="datetime4">
               <a:rPr lang="en-US" smtClean="0"/>
-              <a:t>2/23/2022</a:t>
+              <a:t>3/10/2022</a:t>
             </a:fld>
             <a:endParaRPr lang="en-US"/>
           </a:p>
@@ -5551,7 +5551,7 @@
           <a:p>
             <a:fld id="{25078A64-5338-724D-9253-210B3CE97A87}" type="datetime4">
               <a:rPr lang="en-US" smtClean="0"/>
-              <a:t>2/23/2022</a:t>
+              <a:t>3/10/2022</a:t>
             </a:fld>
             <a:endParaRPr lang="en-US"/>
           </a:p>
@@ -6094,7 +6094,7 @@
           <a:p>
             <a:fld id="{25078A64-5338-724D-9253-210B3CE97A87}" type="datetime4">
               <a:rPr lang="en-US" smtClean="0"/>
-              <a:t>2/23/2022</a:t>
+              <a:t>3/10/2022</a:t>
             </a:fld>
             <a:endParaRPr lang="en-US"/>
           </a:p>
@@ -6194,7 +6194,7 @@
           <a:p>
             <a:fld id="{78D1BCE1-314F-5145-B548-25B12CA3616C}" type="datetime4">
               <a:rPr lang="en-US" smtClean="0"/>
-              <a:t>2/23/2022</a:t>
+              <a:t>3/10/2022</a:t>
             </a:fld>
             <a:endParaRPr dirty="0" lang="en-US"/>
           </a:p>
@@ -6379,8 +6379,26 @@
                       <m:t>=</m:t>
                     </m:r>
                     <m:r>
-                      <m:t>1000</m:t>
+                      <m:t>2.5</m:t>
                     </m:r>
+                    <m:r>
+                      <m:rPr>
+                        <m:sty m:val="p"/>
+                      </m:rPr>
+                      <m:t>×</m:t>
+                    </m:r>
+                    <m:sSup>
+                      <m:e>
+                        <m:r>
+                          <m:t>10</m:t>
+                        </m:r>
+                      </m:e>
+                      <m:sup>
+                        <m:r>
+                          <m:t>4</m:t>
+                        </m:r>
+                      </m:sup>
+                    </m:sSup>
                   </m:oMath>
                 </a14:m>
                 <a:r>
@@ -6501,7 +6519,7 @@
           <a:p>
             <a:fld id="{78D1BCE1-314F-5145-B548-25B12CA3616C}" type="datetime4">
               <a:rPr lang="en-US" smtClean="0"/>
-              <a:t>2/23/2022</a:t>
+              <a:t>3/10/2022</a:t>
             </a:fld>
             <a:endParaRPr dirty="0" lang="en-US"/>
           </a:p>
@@ -6704,37 +6722,37 @@
                       </a:pPr>
                       <a:r>
                         <a:rPr/>
-                        <a:t>0.109</a:t>
-                      </a:r>
-                    </a:p>
-                  </a:txBody>
-                </a:tc>
-                <a:tc>
-                  <a:txBody>
-                    <a:bodyPr/>
-                    <a:lstStyle/>
-                    <a:p>
-                      <a:pPr lvl="0" indent="0" marL="0" algn="r">
-                        <a:buNone/>
-                      </a:pPr>
-                      <a:r>
-                        <a:rPr/>
-                        <a:t>4.93</a:t>
-                      </a:r>
-                    </a:p>
-                  </a:txBody>
-                </a:tc>
-                <a:tc>
-                  <a:txBody>
-                    <a:bodyPr/>
-                    <a:lstStyle/>
-                    <a:p>
-                      <a:pPr lvl="0" indent="0" marL="0" algn="r">
-                        <a:buNone/>
-                      </a:pPr>
-                      <a:r>
-                        <a:rPr/>
-                        <a:t>5.12</a:t>
+                        <a:t>0.106</a:t>
+                      </a:r>
+                    </a:p>
+                  </a:txBody>
+                </a:tc>
+                <a:tc>
+                  <a:txBody>
+                    <a:bodyPr/>
+                    <a:lstStyle/>
+                    <a:p>
+                      <a:pPr lvl="0" indent="0" marL="0" algn="r">
+                        <a:buNone/>
+                      </a:pPr>
+                      <a:r>
+                        <a:rPr/>
+                        <a:t>4.95</a:t>
+                      </a:r>
+                    </a:p>
+                  </a:txBody>
+                </a:tc>
+                <a:tc>
+                  <a:txBody>
+                    <a:bodyPr/>
+                    <a:lstStyle/>
+                    <a:p>
+                      <a:pPr lvl="0" indent="0" marL="0" algn="r">
+                        <a:buNone/>
+                      </a:pPr>
+                      <a:r>
+                        <a:rPr/>
+                        <a:t>5.1</a:t>
                       </a:r>
                     </a:p>
                   </a:txBody>
@@ -6781,37 +6799,37 @@
                       </a:pPr>
                       <a:r>
                         <a:rPr/>
-                        <a:t>0.114</a:t>
-                      </a:r>
-                    </a:p>
-                  </a:txBody>
-                </a:tc>
-                <a:tc>
-                  <a:txBody>
-                    <a:bodyPr/>
-                    <a:lstStyle/>
-                    <a:p>
-                      <a:pPr lvl="0" indent="0" marL="0" algn="r">
-                        <a:buNone/>
-                      </a:pPr>
-                      <a:r>
-                        <a:rPr/>
-                        <a:t>4.93</a:t>
-                      </a:r>
-                    </a:p>
-                  </a:txBody>
-                </a:tc>
-                <a:tc>
-                  <a:txBody>
-                    <a:bodyPr/>
-                    <a:lstStyle/>
-                    <a:p>
-                      <a:pPr lvl="0" indent="0" marL="0" algn="r">
-                        <a:buNone/>
-                      </a:pPr>
-                      <a:r>
-                        <a:rPr/>
-                        <a:t>5.12</a:t>
+                        <a:t>0.106</a:t>
+                      </a:r>
+                    </a:p>
+                  </a:txBody>
+                </a:tc>
+                <a:tc>
+                  <a:txBody>
+                    <a:bodyPr/>
+                    <a:lstStyle/>
+                    <a:p>
+                      <a:pPr lvl="0" indent="0" marL="0" algn="r">
+                        <a:buNone/>
+                      </a:pPr>
+                      <a:r>
+                        <a:rPr/>
+                        <a:t>4.95</a:t>
+                      </a:r>
+                    </a:p>
+                  </a:txBody>
+                </a:tc>
+                <a:tc>
+                  <a:txBody>
+                    <a:bodyPr/>
+                    <a:lstStyle/>
+                    <a:p>
+                      <a:pPr lvl="0" indent="0" marL="0" algn="r">
+                        <a:buNone/>
+                      </a:pPr>
+                      <a:r>
+                        <a:rPr/>
+                        <a:t>5.1</a:t>
                       </a:r>
                     </a:p>
                   </a:txBody>
@@ -6858,7 +6876,7 @@
                       </a:pPr>
                       <a:r>
                         <a:rPr/>
-                        <a:t>0.120</a:t>
+                        <a:t>0.111</a:t>
                       </a:r>
                     </a:p>
                   </a:txBody>
@@ -6935,7 +6953,7 @@
                       </a:pPr>
                       <a:r>
                         <a:rPr/>
-                        <a:t>0.128</a:t>
+                        <a:t>0.116</a:t>
                       </a:r>
                     </a:p>
                   </a:txBody>
@@ -7012,7 +7030,7 @@
                       </a:pPr>
                       <a:r>
                         <a:rPr/>
-                        <a:t>0.138</a:t>
+                        <a:t>0.126</a:t>
                       </a:r>
                     </a:p>
                   </a:txBody>
@@ -7202,37 +7220,37 @@
                       </a:pPr>
                       <a:r>
                         <a:rPr/>
-                        <a:t>0.108</a:t>
-                      </a:r>
-                    </a:p>
-                  </a:txBody>
-                </a:tc>
-                <a:tc>
-                  <a:txBody>
-                    <a:bodyPr/>
-                    <a:lstStyle/>
-                    <a:p>
-                      <a:pPr lvl="0" indent="0" marL="0" algn="r">
-                        <a:buNone/>
-                      </a:pPr>
-                      <a:r>
-                        <a:rPr/>
-                        <a:t>6.80</a:t>
-                      </a:r>
-                    </a:p>
-                  </a:txBody>
-                </a:tc>
-                <a:tc>
-                  <a:txBody>
-                    <a:bodyPr/>
-                    <a:lstStyle/>
-                    <a:p>
-                      <a:pPr lvl="0" indent="0" marL="0" algn="r">
-                        <a:buNone/>
-                      </a:pPr>
-                      <a:r>
-                        <a:rPr/>
-                        <a:t>7.10</a:t>
+                        <a:t>0.104</a:t>
+                      </a:r>
+                    </a:p>
+                  </a:txBody>
+                </a:tc>
+                <a:tc>
+                  <a:txBody>
+                    <a:bodyPr/>
+                    <a:lstStyle/>
+                    <a:p>
+                      <a:pPr lvl="0" indent="0" marL="0" algn="r">
+                        <a:buNone/>
+                      </a:pPr>
+                      <a:r>
+                        <a:rPr/>
+                        <a:t>6.81</a:t>
+                      </a:r>
+                    </a:p>
+                  </a:txBody>
+                </a:tc>
+                <a:tc>
+                  <a:txBody>
+                    <a:bodyPr/>
+                    <a:lstStyle/>
+                    <a:p>
+                      <a:pPr lvl="0" indent="0" marL="0" algn="r">
+                        <a:buNone/>
+                      </a:pPr>
+                      <a:r>
+                        <a:rPr/>
+                        <a:t>7.17</a:t>
                       </a:r>
                     </a:p>
                   </a:txBody>
@@ -7279,7 +7297,7 @@
                       </a:pPr>
                       <a:r>
                         <a:rPr/>
-                        <a:t>0.132</a:t>
+                        <a:t>0.134</a:t>
                       </a:r>
                     </a:p>
                   </a:txBody>
@@ -7356,7 +7374,7 @@
                       </a:pPr>
                       <a:r>
                         <a:rPr/>
-                        <a:t>0.148</a:t>
+                        <a:t>0.144</a:t>
                       </a:r>
                     </a:p>
                   </a:txBody>
@@ -7433,7 +7451,7 @@
                       </a:pPr>
                       <a:r>
                         <a:rPr/>
-                        <a:t>0.174</a:t>
+                        <a:t>0.177</a:t>
                       </a:r>
                     </a:p>
                   </a:txBody>
@@ -7510,37 +7528,37 @@
                       </a:pPr>
                       <a:r>
                         <a:rPr/>
-                        <a:t>0.319</a:t>
-                      </a:r>
-                    </a:p>
-                  </a:txBody>
-                </a:tc>
-                <a:tc>
-                  <a:txBody>
-                    <a:bodyPr/>
-                    <a:lstStyle/>
-                    <a:p>
-                      <a:pPr lvl="0" indent="0" marL="0" algn="r">
-                        <a:buNone/>
-                      </a:pPr>
-                      <a:r>
-                        <a:rPr/>
-                        <a:t>6.71</a:t>
-                      </a:r>
-                    </a:p>
-                  </a:txBody>
-                </a:tc>
-                <a:tc>
-                  <a:txBody>
-                    <a:bodyPr/>
-                    <a:lstStyle/>
-                    <a:p>
-                      <a:pPr lvl="0" indent="0" marL="0" algn="r">
-                        <a:buNone/>
-                      </a:pPr>
-                      <a:r>
-                        <a:rPr/>
-                        <a:t>7.21</a:t>
+                        <a:t>0.326</a:t>
+                      </a:r>
+                    </a:p>
+                  </a:txBody>
+                </a:tc>
+                <a:tc>
+                  <a:txBody>
+                    <a:bodyPr/>
+                    <a:lstStyle/>
+                    <a:p>
+                      <a:pPr lvl="0" indent="0" marL="0" algn="r">
+                        <a:buNone/>
+                      </a:pPr>
+                      <a:r>
+                        <a:rPr/>
+                        <a:t>6.72</a:t>
+                      </a:r>
+                    </a:p>
+                  </a:txBody>
+                </a:tc>
+                <a:tc>
+                  <a:txBody>
+                    <a:bodyPr/>
+                    <a:lstStyle/>
+                    <a:p>
+                      <a:pPr lvl="0" indent="0" marL="0" algn="r">
+                        <a:buNone/>
+                      </a:pPr>
+                      <a:r>
+                        <a:rPr/>
+                        <a:t>7.26</a:t>
                       </a:r>
                     </a:p>
                   </a:txBody>
@@ -7567,7 +7585,7 @@
           <a:p>
             <a:fld id="{25078A64-5338-724D-9253-210B3CE97A87}" type="datetime4">
               <a:rPr lang="en-US" smtClean="0"/>
-              <a:t>2/23/2022</a:t>
+              <a:t>3/10/2022</a:t>
             </a:fld>
             <a:endParaRPr lang="en-US"/>
           </a:p>
@@ -7709,7 +7727,7 @@
           <a:p>
             <a:fld id="{78D1BCE1-314F-5145-B548-25B12CA3616C}" type="datetime4">
               <a:rPr lang="en-US" smtClean="0"/>
-              <a:t>2/23/2022</a:t>
+              <a:t>3/10/2022</a:t>
             </a:fld>
             <a:endParaRPr dirty="0" lang="en-US"/>
           </a:p>
@@ -7971,22 +7989,22 @@
                       </a:pPr>
                       <a:r>
                         <a:rPr/>
-                        <a:t>0.096</a:t>
-                      </a:r>
-                    </a:p>
-                  </a:txBody>
-                </a:tc>
-                <a:tc>
-                  <a:txBody>
-                    <a:bodyPr/>
-                    <a:lstStyle/>
-                    <a:p>
-                      <a:pPr lvl="0" indent="0" marL="0" algn="r">
-                        <a:buNone/>
-                      </a:pPr>
-                      <a:r>
-                        <a:rPr/>
-                        <a:t>10.8</a:t>
+                        <a:t>0.107</a:t>
+                      </a:r>
+                    </a:p>
+                  </a:txBody>
+                </a:tc>
+                <a:tc>
+                  <a:txBody>
+                    <a:bodyPr/>
+                    <a:lstStyle/>
+                    <a:p>
+                      <a:pPr lvl="0" indent="0" marL="0" algn="r">
+                        <a:buNone/>
+                      </a:pPr>
+                      <a:r>
+                        <a:rPr/>
+                        <a:t>10.7</a:t>
                       </a:r>
                     </a:p>
                   </a:txBody>
@@ -8048,7 +8066,7 @@
                       </a:pPr>
                       <a:r>
                         <a:rPr/>
-                        <a:t>0.186</a:t>
+                        <a:t>0.199</a:t>
                       </a:r>
                     </a:p>
                   </a:txBody>
@@ -8125,7 +8143,7 @@
                       </a:pPr>
                       <a:r>
                         <a:rPr/>
-                        <a:t>0.195</a:t>
+                        <a:t>0.205</a:t>
                       </a:r>
                     </a:p>
                   </a:txBody>
@@ -8202,7 +8220,7 @@
                       </a:pPr>
                       <a:r>
                         <a:rPr/>
-                        <a:t>0.233</a:t>
+                        <a:t>0.246</a:t>
                       </a:r>
                     </a:p>
                   </a:txBody>
@@ -8279,37 +8297,37 @@
                       </a:pPr>
                       <a:r>
                         <a:rPr/>
-                        <a:t>0.550</a:t>
-                      </a:r>
-                    </a:p>
-                  </a:txBody>
-                </a:tc>
-                <a:tc>
-                  <a:txBody>
-                    <a:bodyPr/>
-                    <a:lstStyle/>
-                    <a:p>
-                      <a:pPr lvl="0" indent="0" marL="0" algn="r">
-                        <a:buNone/>
-                      </a:pPr>
-                      <a:r>
-                        <a:rPr/>
-                        <a:t>10.3</a:t>
-                      </a:r>
-                    </a:p>
-                  </a:txBody>
-                </a:tc>
-                <a:tc>
-                  <a:txBody>
-                    <a:bodyPr/>
-                    <a:lstStyle/>
-                    <a:p>
-                      <a:pPr lvl="0" indent="0" marL="0" algn="r">
-                        <a:buNone/>
-                      </a:pPr>
-                      <a:r>
-                        <a:rPr/>
-                        <a:t>12.7</a:t>
+                        <a:t>0.572</a:t>
+                      </a:r>
+                    </a:p>
+                  </a:txBody>
+                </a:tc>
+                <a:tc>
+                  <a:txBody>
+                    <a:bodyPr/>
+                    <a:lstStyle/>
+                    <a:p>
+                      <a:pPr lvl="0" indent="0" marL="0" algn="r">
+                        <a:buNone/>
+                      </a:pPr>
+                      <a:r>
+                        <a:rPr/>
+                        <a:t>10.2</a:t>
+                      </a:r>
+                    </a:p>
+                  </a:txBody>
+                </a:tc>
+                <a:tc>
+                  <a:txBody>
+                    <a:bodyPr/>
+                    <a:lstStyle/>
+                    <a:p>
+                      <a:pPr lvl="0" indent="0" marL="0" algn="r">
+                        <a:buNone/>
+                      </a:pPr>
+                      <a:r>
+                        <a:rPr/>
+                        <a:t>12.6</a:t>
                       </a:r>
                     </a:p>
                   </a:txBody>
@@ -8336,7 +8354,7 @@
           <a:p>
             <a:fld id="{25078A64-5338-724D-9253-210B3CE97A87}" type="datetime4">
               <a:rPr lang="en-US" smtClean="0"/>
-              <a:t>2/23/2022</a:t>
+              <a:t>3/10/2022</a:t>
             </a:fld>
             <a:endParaRPr lang="en-US"/>
           </a:p>
@@ -8584,7 +8602,7 @@
           <a:p>
             <a:fld id="{78D1BCE1-314F-5145-B548-25B12CA3616C}" type="datetime4">
               <a:rPr lang="en-US" smtClean="0"/>
-              <a:t>2/23/2022</a:t>
+              <a:t>3/10/2022</a:t>
             </a:fld>
             <a:endParaRPr dirty="0" lang="en-US"/>
           </a:p>
@@ -9040,7 +9058,7 @@
           <a:p>
             <a:fld id="{78D1BCE1-314F-5145-B548-25B12CA3616C}" type="datetime4">
               <a:rPr lang="en-US" smtClean="0"/>
-              <a:t>2/23/2022</a:t>
+              <a:t>3/10/2022</a:t>
             </a:fld>
             <a:endParaRPr dirty="0" lang="en-US"/>
           </a:p>
@@ -9777,7 +9795,7 @@
           <a:p>
             <a:fld id="{78D1BCE1-314F-5145-B548-25B12CA3616C}" type="datetime4">
               <a:rPr lang="en-US" smtClean="0"/>
-              <a:t>2/23/2022</a:t>
+              <a:t>3/10/2022</a:t>
             </a:fld>
             <a:endParaRPr dirty="0" lang="en-US"/>
           </a:p>
@@ -10491,7 +10509,7 @@
           <a:p>
             <a:fld id="{78D1BCE1-314F-5145-B548-25B12CA3616C}" type="datetime4">
               <a:rPr lang="en-US" smtClean="0"/>
-              <a:t>2/23/2022</a:t>
+              <a:t>3/10/2022</a:t>
             </a:fld>
             <a:endParaRPr dirty="0" lang="en-US"/>
           </a:p>
@@ -10591,7 +10609,7 @@
           <a:p>
             <a:fld id="{78D1BCE1-314F-5145-B548-25B12CA3616C}" type="datetime4">
               <a:rPr lang="en-US" smtClean="0"/>
-              <a:t>2/23/2022</a:t>
+              <a:t>3/10/2022</a:t>
             </a:fld>
             <a:endParaRPr dirty="0" lang="en-US"/>
           </a:p>
@@ -10794,7 +10812,7 @@
           <a:p>
             <a:fld id="{78D1BCE1-314F-5145-B548-25B12CA3616C}" type="datetime4">
               <a:rPr lang="en-US" smtClean="0"/>
-              <a:t>2/23/2022</a:t>
+              <a:t>3/10/2022</a:t>
             </a:fld>
             <a:endParaRPr dirty="0" lang="en-US"/>
           </a:p>
@@ -11379,7 +11397,7 @@
           <a:p>
             <a:fld id="{25078A64-5338-724D-9253-210B3CE97A87}" type="datetime4">
               <a:rPr lang="en-US" smtClean="0"/>
-              <a:t>2/23/2022</a:t>
+              <a:t>3/10/2022</a:t>
             </a:fld>
             <a:endParaRPr lang="en-US"/>
           </a:p>
@@ -11479,7 +11497,7 @@
           <a:p>
             <a:fld id="{78D1BCE1-314F-5145-B548-25B12CA3616C}" type="datetime4">
               <a:rPr lang="en-US" smtClean="0"/>
-              <a:t>2/23/2022</a:t>
+              <a:t>3/10/2022</a:t>
             </a:fld>
             <a:endParaRPr dirty="0" lang="en-US"/>
           </a:p>
@@ -11566,8 +11584,26 @@
                       <m:t>=</m:t>
                     </m:r>
                     <m:r>
-                      <m:t>1000</m:t>
+                      <m:t>2.5</m:t>
                     </m:r>
+                    <m:r>
+                      <m:rPr>
+                        <m:sty m:val="p"/>
+                      </m:rPr>
+                      <m:t>×</m:t>
+                    </m:r>
+                    <m:sSup>
+                      <m:e>
+                        <m:r>
+                          <m:t>10</m:t>
+                        </m:r>
+                      </m:e>
+                      <m:sup>
+                        <m:r>
+                          <m:t>4</m:t>
+                        </m:r>
+                      </m:sup>
+                    </m:sSup>
                   </m:oMath>
                 </a14:m>
                 <a:r>
@@ -11741,7 +11777,7 @@
                       </a:pPr>
                       <a:r>
                         <a:rPr/>
-                        <a:t>25.6</a:t>
+                        <a:t>25.7</a:t>
                       </a:r>
                     </a:p>
                   </a:txBody>
@@ -11773,37 +11809,37 @@
                       </a:pPr>
                       <a:r>
                         <a:rPr/>
-                        <a:t>0.148</a:t>
-                      </a:r>
-                    </a:p>
-                  </a:txBody>
-                </a:tc>
-                <a:tc>
-                  <a:txBody>
-                    <a:bodyPr/>
-                    <a:lstStyle/>
-                    <a:p>
-                      <a:pPr lvl="0" indent="0" marL="0" algn="r">
-                        <a:buNone/>
-                      </a:pPr>
-                      <a:r>
-                        <a:rPr/>
-                        <a:t>17.4</a:t>
-                      </a:r>
-                    </a:p>
-                  </a:txBody>
-                </a:tc>
-                <a:tc>
-                  <a:txBody>
-                    <a:bodyPr/>
-                    <a:lstStyle/>
-                    <a:p>
-                      <a:pPr lvl="0" indent="0" marL="0" algn="r">
-                        <a:buNone/>
-                      </a:pPr>
-                      <a:r>
-                        <a:rPr/>
-                        <a:t>31.3</a:t>
+                        <a:t>0.131</a:t>
+                      </a:r>
+                    </a:p>
+                  </a:txBody>
+                </a:tc>
+                <a:tc>
+                  <a:txBody>
+                    <a:bodyPr/>
+                    <a:lstStyle/>
+                    <a:p>
+                      <a:pPr lvl="0" indent="0" marL="0" algn="r">
+                        <a:buNone/>
+                      </a:pPr>
+                      <a:r>
+                        <a:rPr/>
+                        <a:t>17.5</a:t>
+                      </a:r>
+                    </a:p>
+                  </a:txBody>
+                </a:tc>
+                <a:tc>
+                  <a:txBody>
+                    <a:bodyPr/>
+                    <a:lstStyle/>
+                    <a:p>
+                      <a:pPr lvl="0" indent="0" marL="0" algn="r">
+                        <a:buNone/>
+                      </a:pPr>
+                      <a:r>
+                        <a:rPr/>
+                        <a:t>31.7</a:t>
                       </a:r>
                     </a:p>
                   </a:txBody>
@@ -11835,7 +11871,7 @@
                       </a:pPr>
                       <a:r>
                         <a:rPr/>
-                        <a:t>0.290</a:t>
+                        <a:t>0.305</a:t>
                       </a:r>
                     </a:p>
                   </a:txBody>
@@ -11897,7 +11933,7 @@
                       </a:pPr>
                       <a:r>
                         <a:rPr/>
-                        <a:t>0.290</a:t>
+                        <a:t>0.307</a:t>
                       </a:r>
                     </a:p>
                   </a:txBody>
@@ -11959,7 +11995,7 @@
                       </a:pPr>
                       <a:r>
                         <a:rPr/>
-                        <a:t>0.346</a:t>
+                        <a:t>0.350</a:t>
                       </a:r>
                     </a:p>
                   </a:txBody>
@@ -12021,37 +12057,37 @@
                       </a:pPr>
                       <a:r>
                         <a:rPr/>
-                        <a:t>0.743</a:t>
-                      </a:r>
-                    </a:p>
-                  </a:txBody>
-                </a:tc>
-                <a:tc>
-                  <a:txBody>
-                    <a:bodyPr/>
-                    <a:lstStyle/>
-                    <a:p>
-                      <a:pPr lvl="0" indent="0" marL="0" algn="r">
-                        <a:buNone/>
-                      </a:pPr>
-                      <a:r>
-                        <a:rPr/>
-                        <a:t>13.1</a:t>
-                      </a:r>
-                    </a:p>
-                  </a:txBody>
-                </a:tc>
-                <a:tc>
-                  <a:txBody>
-                    <a:bodyPr/>
-                    <a:lstStyle/>
-                    <a:p>
-                      <a:pPr lvl="0" indent="0" marL="0" algn="r">
-                        <a:buNone/>
-                      </a:pPr>
-                      <a:r>
-                        <a:rPr/>
-                        <a:t>39.2</a:t>
+                        <a:t>0.740</a:t>
+                      </a:r>
+                    </a:p>
+                  </a:txBody>
+                </a:tc>
+                <a:tc>
+                  <a:txBody>
+                    <a:bodyPr/>
+                    <a:lstStyle/>
+                    <a:p>
+                      <a:pPr lvl="0" indent="0" marL="0" algn="r">
+                        <a:buNone/>
+                      </a:pPr>
+                      <a:r>
+                        <a:rPr/>
+                        <a:t>13.3</a:t>
+                      </a:r>
+                    </a:p>
+                  </a:txBody>
+                </a:tc>
+                <a:tc>
+                  <a:txBody>
+                    <a:bodyPr/>
+                    <a:lstStyle/>
+                    <a:p>
+                      <a:pPr lvl="0" indent="0" marL="0" algn="r">
+                        <a:buNone/>
+                      </a:pPr>
+                      <a:r>
+                        <a:rPr/>
+                        <a:t>39.5</a:t>
                       </a:r>
                     </a:p>
                   </a:txBody>
@@ -12078,7 +12114,7 @@
           <a:p>
             <a:fld id="{25078A64-5338-724D-9253-210B3CE97A87}" type="datetime4">
               <a:rPr lang="en-US" smtClean="0"/>
-              <a:t>2/23/2022</a:t>
+              <a:t>3/10/2022</a:t>
             </a:fld>
             <a:endParaRPr lang="en-US"/>
           </a:p>
@@ -12451,7 +12487,7 @@
           <a:p>
             <a:fld id="{78D1BCE1-314F-5145-B548-25B12CA3616C}" type="datetime4">
               <a:rPr lang="en-US" smtClean="0"/>
-              <a:t>2/23/2022</a:t>
+              <a:t>3/10/2022</a:t>
             </a:fld>
             <a:endParaRPr dirty="0" lang="en-US"/>
           </a:p>
@@ -12745,7 +12781,7 @@
           <a:p>
             <a:fld id="{78D1BCE1-314F-5145-B548-25B12CA3616C}" type="datetime4">
               <a:rPr lang="en-US" smtClean="0"/>
-              <a:t>2/23/2022</a:t>
+              <a:t>3/10/2022</a:t>
             </a:fld>
             <a:endParaRPr dirty="0" lang="en-US"/>
           </a:p>
@@ -12894,7 +12930,7 @@
           <a:p>
             <a:fld id="{78D1BCE1-314F-5145-B548-25B12CA3616C}" type="datetime4">
               <a:rPr lang="en-US" smtClean="0"/>
-              <a:t>2/23/2022</a:t>
+              <a:t>3/10/2022</a:t>
             </a:fld>
             <a:endParaRPr dirty="0" lang="en-US"/>
           </a:p>
@@ -13260,7 +13296,7 @@
           <a:p>
             <a:fld id="{78D1BCE1-314F-5145-B548-25B12CA3616C}" type="datetime4">
               <a:rPr lang="en-US" smtClean="0"/>
-              <a:t>2/23/2022</a:t>
+              <a:t>3/10/2022</a:t>
             </a:fld>
             <a:endParaRPr dirty="0" lang="en-US"/>
           </a:p>
@@ -13729,7 +13765,7 @@
           <a:p>
             <a:fld id="{78D1BCE1-314F-5145-B548-25B12CA3616C}" type="datetime4">
               <a:rPr lang="en-US" smtClean="0"/>
-              <a:t>2/23/2022</a:t>
+              <a:t>3/10/2022</a:t>
             </a:fld>
             <a:endParaRPr dirty="0" lang="en-US"/>
           </a:p>
@@ -14565,7 +14601,7 @@
           <a:p>
             <a:fld id="{78D1BCE1-314F-5145-B548-25B12CA3616C}" type="datetime4">
               <a:rPr lang="en-US" smtClean="0"/>
-              <a:t>2/23/2022</a:t>
+              <a:t>3/10/2022</a:t>
             </a:fld>
             <a:endParaRPr dirty="0" lang="en-US"/>
           </a:p>
@@ -15171,7 +15207,7 @@
           <a:p>
             <a:fld id="{78D1BCE1-314F-5145-B548-25B12CA3616C}" type="datetime4">
               <a:rPr lang="en-US" smtClean="0"/>
-              <a:t>2/23/2022</a:t>
+              <a:t>3/10/2022</a:t>
             </a:fld>
             <a:endParaRPr dirty="0" lang="en-US"/>
           </a:p>
@@ -15271,7 +15307,7 @@
           <a:p>
             <a:fld id="{78D1BCE1-314F-5145-B548-25B12CA3616C}" type="datetime4">
               <a:rPr lang="en-US" smtClean="0"/>
-              <a:t>2/23/2022</a:t>
+              <a:t>3/10/2022</a:t>
             </a:fld>
             <a:endParaRPr dirty="0" lang="en-US"/>
           </a:p>
@@ -15465,7 +15501,7 @@
           <a:p>
             <a:fld id="{78D1BCE1-314F-5145-B548-25B12CA3616C}" type="datetime4">
               <a:rPr lang="en-US" smtClean="0"/>
-              <a:t>2/23/2022</a:t>
+              <a:t>3/10/2022</a:t>
             </a:fld>
             <a:endParaRPr dirty="0" lang="en-US"/>
           </a:p>

</xml_diff>

<commit_message>
removed scientific notation and updated ppt and pdf
</commit_message>
<xml_diff>
--- a/time_series_regression.pptx
+++ b/time_series_regression.pptx
@@ -3718,7 +3718,7 @@
                       </a:pPr>
                       <a:r>
                         <a:rPr/>
-                        <a:t>9.84e-10</a:t>
+                        <a:t>0.000000000984</a:t>
                       </a:r>
                     </a:p>
                   </a:txBody>
@@ -6379,26 +6379,8 @@
                       <m:t>=</m:t>
                     </m:r>
                     <m:r>
-                      <m:t>2.5</m:t>
+                      <m:t>25000</m:t>
                     </m:r>
-                    <m:r>
-                      <m:rPr>
-                        <m:sty m:val="p"/>
-                      </m:rPr>
-                      <m:t>×</m:t>
-                    </m:r>
-                    <m:sSup>
-                      <m:e>
-                        <m:r>
-                          <m:t>10</m:t>
-                        </m:r>
-                      </m:e>
-                      <m:sup>
-                        <m:r>
-                          <m:t>4</m:t>
-                        </m:r>
-                      </m:sup>
-                    </m:sSup>
                   </m:oMath>
                 </a14:m>
                 <a:r>
@@ -11584,26 +11566,8 @@
                       <m:t>=</m:t>
                     </m:r>
                     <m:r>
-                      <m:t>2.5</m:t>
+                      <m:t>25000</m:t>
                     </m:r>
-                    <m:r>
-                      <m:rPr>
-                        <m:sty m:val="p"/>
-                      </m:rPr>
-                      <m:t>×</m:t>
-                    </m:r>
-                    <m:sSup>
-                      <m:e>
-                        <m:r>
-                          <m:t>10</m:t>
-                        </m:r>
-                      </m:e>
-                      <m:sup>
-                        <m:r>
-                          <m:t>4</m:t>
-                        </m:r>
-                      </m:sup>
-                    </m:sSup>
                   </m:oMath>
                 </a14:m>
                 <a:r>

</xml_diff>